<commit_message>
saved update on PPT
</commit_message>
<xml_diff>
--- a/sgoodel3template.pptx
+++ b/sgoodel3template.pptx
@@ -5,22 +5,27 @@
     <p:sldMasterId id="2147483648" r:id="rId1"/>
   </p:sldMasterIdLst>
   <p:notesMasterIdLst>
-    <p:notesMasterId r:id="rId12"/>
+    <p:notesMasterId r:id="rId17"/>
   </p:notesMasterIdLst>
   <p:handoutMasterIdLst>
-    <p:handoutMasterId r:id="rId13"/>
+    <p:handoutMasterId r:id="rId18"/>
   </p:handoutMasterIdLst>
   <p:sldIdLst>
     <p:sldId id="256" r:id="rId2"/>
     <p:sldId id="257" r:id="rId3"/>
-    <p:sldId id="259" r:id="rId4"/>
-    <p:sldId id="260" r:id="rId5"/>
-    <p:sldId id="263" r:id="rId6"/>
-    <p:sldId id="264" r:id="rId7"/>
-    <p:sldId id="265" r:id="rId8"/>
-    <p:sldId id="266" r:id="rId9"/>
-    <p:sldId id="262" r:id="rId10"/>
-    <p:sldId id="267" r:id="rId11"/>
+    <p:sldId id="268" r:id="rId4"/>
+    <p:sldId id="259" r:id="rId5"/>
+    <p:sldId id="260" r:id="rId6"/>
+    <p:sldId id="271" r:id="rId7"/>
+    <p:sldId id="269" r:id="rId8"/>
+    <p:sldId id="272" r:id="rId9"/>
+    <p:sldId id="270" r:id="rId10"/>
+    <p:sldId id="263" r:id="rId11"/>
+    <p:sldId id="264" r:id="rId12"/>
+    <p:sldId id="265" r:id="rId13"/>
+    <p:sldId id="266" r:id="rId14"/>
+    <p:sldId id="262" r:id="rId15"/>
+    <p:sldId id="267" r:id="rId16"/>
   </p:sldIdLst>
   <p:sldSz cx="9144000" cy="6858000" type="screen4x3"/>
   <p:notesSz cx="6858000" cy="9144000"/>
@@ -642,6 +647,667 @@
     </a:lvl9pPr>
   </p:notesStyle>
 </p:notesMaster>
+</file>
+
+<file path=ppt/notesSlides/notesSlide1.xml><?xml version="1.0" encoding="utf-8"?>
+<p:notes xmlns:a="http://schemas.openxmlformats.org/drawingml/2006/main" xmlns:r="http://schemas.openxmlformats.org/officeDocument/2006/relationships" xmlns:p="http://schemas.openxmlformats.org/presentationml/2006/main">
+  <p:cSld>
+    <p:spTree>
+      <p:nvGrpSpPr>
+        <p:cNvPr id="1" name=""/>
+        <p:cNvGrpSpPr/>
+        <p:nvPr/>
+      </p:nvGrpSpPr>
+      <p:grpSpPr>
+        <a:xfrm>
+          <a:off x="0" y="0"/>
+          <a:ext cx="0" cy="0"/>
+          <a:chOff x="0" y="0"/>
+          <a:chExt cx="0" cy="0"/>
+        </a:xfrm>
+      </p:grpSpPr>
+      <p:sp>
+        <p:nvSpPr>
+          <p:cNvPr id="2" name="Slide Image Placeholder 1"/>
+          <p:cNvSpPr>
+            <a:spLocks noGrp="1" noRot="1" noChangeAspect="1"/>
+          </p:cNvSpPr>
+          <p:nvPr>
+            <p:ph type="sldImg"/>
+          </p:nvPr>
+        </p:nvSpPr>
+        <p:spPr/>
+      </p:sp>
+      <p:sp>
+        <p:nvSpPr>
+          <p:cNvPr id="3" name="Notes Placeholder 2"/>
+          <p:cNvSpPr>
+            <a:spLocks noGrp="1"/>
+          </p:cNvSpPr>
+          <p:nvPr>
+            <p:ph type="body" idx="1"/>
+          </p:nvPr>
+        </p:nvSpPr>
+        <p:spPr/>
+        <p:txBody>
+          <a:bodyPr/>
+          <a:lstStyle/>
+          <a:p>
+            <a:endParaRPr lang="en-US" dirty="0"/>
+          </a:p>
+        </p:txBody>
+      </p:sp>
+      <p:sp>
+        <p:nvSpPr>
+          <p:cNvPr id="4" name="Slide Number Placeholder 3"/>
+          <p:cNvSpPr>
+            <a:spLocks noGrp="1"/>
+          </p:cNvSpPr>
+          <p:nvPr>
+            <p:ph type="sldNum" sz="quarter" idx="10"/>
+          </p:nvPr>
+        </p:nvSpPr>
+        <p:spPr/>
+        <p:txBody>
+          <a:bodyPr/>
+          <a:lstStyle/>
+          <a:p>
+            <a:fld id="{DBD033B5-E4C0-4F9D-B175-F7B995E6883E}" type="slidenum">
+              <a:rPr lang="ru-RU" smtClean="0"/>
+              <a:pPr/>
+              <a:t>5</a:t>
+            </a:fld>
+            <a:endParaRPr lang="ru-RU"/>
+          </a:p>
+        </p:txBody>
+      </p:sp>
+    </p:spTree>
+    <p:extLst>
+      <p:ext uri="{BB962C8B-B14F-4D97-AF65-F5344CB8AC3E}">
+        <p14:creationId xmlns:p14="http://schemas.microsoft.com/office/powerpoint/2010/main" val="1042118989"/>
+      </p:ext>
+    </p:extLst>
+  </p:cSld>
+  <p:clrMapOvr>
+    <a:masterClrMapping/>
+  </p:clrMapOvr>
+</p:notes>
+</file>
+
+<file path=ppt/notesSlides/notesSlide2.xml><?xml version="1.0" encoding="utf-8"?>
+<p:notes xmlns:a="http://schemas.openxmlformats.org/drawingml/2006/main" xmlns:r="http://schemas.openxmlformats.org/officeDocument/2006/relationships" xmlns:p="http://schemas.openxmlformats.org/presentationml/2006/main">
+  <p:cSld>
+    <p:spTree>
+      <p:nvGrpSpPr>
+        <p:cNvPr id="1" name=""/>
+        <p:cNvGrpSpPr/>
+        <p:nvPr/>
+      </p:nvGrpSpPr>
+      <p:grpSpPr>
+        <a:xfrm>
+          <a:off x="0" y="0"/>
+          <a:ext cx="0" cy="0"/>
+          <a:chOff x="0" y="0"/>
+          <a:chExt cx="0" cy="0"/>
+        </a:xfrm>
+      </p:grpSpPr>
+      <p:sp>
+        <p:nvSpPr>
+          <p:cNvPr id="2" name="Slide Image Placeholder 1"/>
+          <p:cNvSpPr>
+            <a:spLocks noGrp="1" noRot="1" noChangeAspect="1"/>
+          </p:cNvSpPr>
+          <p:nvPr>
+            <p:ph type="sldImg"/>
+          </p:nvPr>
+        </p:nvSpPr>
+        <p:spPr/>
+      </p:sp>
+      <p:sp>
+        <p:nvSpPr>
+          <p:cNvPr id="3" name="Notes Placeholder 2"/>
+          <p:cNvSpPr>
+            <a:spLocks noGrp="1"/>
+          </p:cNvSpPr>
+          <p:nvPr>
+            <p:ph type="body" idx="1"/>
+          </p:nvPr>
+        </p:nvSpPr>
+        <p:spPr/>
+        <p:txBody>
+          <a:bodyPr/>
+          <a:lstStyle/>
+          <a:p>
+            <a:pPr lvl="2">
+              <a:lnSpc>
+                <a:spcPct val="80000"/>
+              </a:lnSpc>
+            </a:pPr>
+            <a:r>
+              <a:rPr lang="en-US" sz="1000" dirty="0" smtClean="0"/>
+              <a:t>Headers had to be removed and the grouping by age columns had to be put in place</a:t>
+            </a:r>
+          </a:p>
+          <a:p>
+            <a:pPr lvl="2">
+              <a:lnSpc>
+                <a:spcPct val="80000"/>
+              </a:lnSpc>
+            </a:pPr>
+            <a:r>
+              <a:rPr lang="en-US" sz="1000" dirty="0" smtClean="0"/>
+              <a:t>Final Data frame was created – </a:t>
+            </a:r>
+            <a:r>
+              <a:rPr lang="en-US" sz="1000" dirty="0" err="1" smtClean="0"/>
+              <a:t>fertility_clean</a:t>
+            </a:r>
+            <a:endParaRPr lang="en-US" sz="1000" dirty="0" smtClean="0"/>
+          </a:p>
+          <a:p>
+            <a:pPr lvl="2">
+              <a:lnSpc>
+                <a:spcPct val="80000"/>
+              </a:lnSpc>
+            </a:pPr>
+            <a:r>
+              <a:rPr lang="en-US" sz="1000" dirty="0" smtClean="0"/>
+              <a:t>For sharing this main file was written to a csv file </a:t>
+            </a:r>
+            <a:r>
+              <a:rPr lang="en-US" sz="1000" b="1" dirty="0" smtClean="0"/>
+              <a:t>(add file name)</a:t>
+            </a:r>
+          </a:p>
+          <a:p>
+            <a:pPr lvl="2">
+              <a:lnSpc>
+                <a:spcPct val="80000"/>
+              </a:lnSpc>
+            </a:pPr>
+            <a:r>
+              <a:rPr lang="en-US" sz="1000" dirty="0" smtClean="0"/>
+              <a:t>Sorting and retrieving only the most recent year was done – (</a:t>
+            </a:r>
+            <a:r>
+              <a:rPr lang="en-US" sz="1000" dirty="0" err="1" smtClean="0"/>
+              <a:t>DataFrame</a:t>
+            </a:r>
+            <a:r>
+              <a:rPr lang="en-US" sz="1000" dirty="0" smtClean="0"/>
+              <a:t>: </a:t>
+            </a:r>
+            <a:r>
+              <a:rPr lang="en-US" sz="1000" dirty="0" err="1" smtClean="0"/>
+              <a:t>last_year</a:t>
+            </a:r>
+            <a:endParaRPr lang="en-US" sz="1000" dirty="0" smtClean="0"/>
+          </a:p>
+          <a:p>
+            <a:endParaRPr lang="en-US" dirty="0"/>
+          </a:p>
+        </p:txBody>
+      </p:sp>
+      <p:sp>
+        <p:nvSpPr>
+          <p:cNvPr id="4" name="Slide Number Placeholder 3"/>
+          <p:cNvSpPr>
+            <a:spLocks noGrp="1"/>
+          </p:cNvSpPr>
+          <p:nvPr>
+            <p:ph type="sldNum" sz="quarter" idx="10"/>
+          </p:nvPr>
+        </p:nvSpPr>
+        <p:spPr/>
+        <p:txBody>
+          <a:bodyPr/>
+          <a:lstStyle/>
+          <a:p>
+            <a:fld id="{DBD033B5-E4C0-4F9D-B175-F7B995E6883E}" type="slidenum">
+              <a:rPr lang="ru-RU" smtClean="0"/>
+              <a:pPr/>
+              <a:t>6</a:t>
+            </a:fld>
+            <a:endParaRPr lang="ru-RU"/>
+          </a:p>
+        </p:txBody>
+      </p:sp>
+    </p:spTree>
+    <p:extLst>
+      <p:ext uri="{BB962C8B-B14F-4D97-AF65-F5344CB8AC3E}">
+        <p14:creationId xmlns:p14="http://schemas.microsoft.com/office/powerpoint/2010/main" val="1442167273"/>
+      </p:ext>
+    </p:extLst>
+  </p:cSld>
+  <p:clrMapOvr>
+    <a:masterClrMapping/>
+  </p:clrMapOvr>
+</p:notes>
+</file>
+
+<file path=ppt/notesSlides/notesSlide3.xml><?xml version="1.0" encoding="utf-8"?>
+<p:notes xmlns:a="http://schemas.openxmlformats.org/drawingml/2006/main" xmlns:r="http://schemas.openxmlformats.org/officeDocument/2006/relationships" xmlns:p="http://schemas.openxmlformats.org/presentationml/2006/main">
+  <p:cSld>
+    <p:spTree>
+      <p:nvGrpSpPr>
+        <p:cNvPr id="1" name=""/>
+        <p:cNvGrpSpPr/>
+        <p:nvPr/>
+      </p:nvGrpSpPr>
+      <p:grpSpPr>
+        <a:xfrm>
+          <a:off x="0" y="0"/>
+          <a:ext cx="0" cy="0"/>
+          <a:chOff x="0" y="0"/>
+          <a:chExt cx="0" cy="0"/>
+        </a:xfrm>
+      </p:grpSpPr>
+      <p:sp>
+        <p:nvSpPr>
+          <p:cNvPr id="2" name="Slide Image Placeholder 1"/>
+          <p:cNvSpPr>
+            <a:spLocks noGrp="1" noRot="1" noChangeAspect="1"/>
+          </p:cNvSpPr>
+          <p:nvPr>
+            <p:ph type="sldImg"/>
+          </p:nvPr>
+        </p:nvSpPr>
+        <p:spPr/>
+      </p:sp>
+      <p:sp>
+        <p:nvSpPr>
+          <p:cNvPr id="3" name="Notes Placeholder 2"/>
+          <p:cNvSpPr>
+            <a:spLocks noGrp="1"/>
+          </p:cNvSpPr>
+          <p:nvPr>
+            <p:ph type="body" idx="1"/>
+          </p:nvPr>
+        </p:nvSpPr>
+        <p:spPr/>
+        <p:txBody>
+          <a:bodyPr/>
+          <a:lstStyle/>
+          <a:p>
+            <a:endParaRPr lang="en-US" dirty="0"/>
+          </a:p>
+        </p:txBody>
+      </p:sp>
+      <p:sp>
+        <p:nvSpPr>
+          <p:cNvPr id="4" name="Slide Number Placeholder 3"/>
+          <p:cNvSpPr>
+            <a:spLocks noGrp="1"/>
+          </p:cNvSpPr>
+          <p:nvPr>
+            <p:ph type="sldNum" sz="quarter" idx="10"/>
+          </p:nvPr>
+        </p:nvSpPr>
+        <p:spPr/>
+        <p:txBody>
+          <a:bodyPr/>
+          <a:lstStyle/>
+          <a:p>
+            <a:fld id="{DBD033B5-E4C0-4F9D-B175-F7B995E6883E}" type="slidenum">
+              <a:rPr lang="ru-RU" smtClean="0"/>
+              <a:pPr/>
+              <a:t>7</a:t>
+            </a:fld>
+            <a:endParaRPr lang="ru-RU"/>
+          </a:p>
+        </p:txBody>
+      </p:sp>
+    </p:spTree>
+    <p:extLst>
+      <p:ext uri="{BB962C8B-B14F-4D97-AF65-F5344CB8AC3E}">
+        <p14:creationId xmlns:p14="http://schemas.microsoft.com/office/powerpoint/2010/main" val="788858722"/>
+      </p:ext>
+    </p:extLst>
+  </p:cSld>
+  <p:clrMapOvr>
+    <a:masterClrMapping/>
+  </p:clrMapOvr>
+</p:notes>
+</file>
+
+<file path=ppt/notesSlides/notesSlide4.xml><?xml version="1.0" encoding="utf-8"?>
+<p:notes xmlns:a="http://schemas.openxmlformats.org/drawingml/2006/main" xmlns:r="http://schemas.openxmlformats.org/officeDocument/2006/relationships" xmlns:p="http://schemas.openxmlformats.org/presentationml/2006/main">
+  <p:cSld>
+    <p:spTree>
+      <p:nvGrpSpPr>
+        <p:cNvPr id="1" name=""/>
+        <p:cNvGrpSpPr/>
+        <p:nvPr/>
+      </p:nvGrpSpPr>
+      <p:grpSpPr>
+        <a:xfrm>
+          <a:off x="0" y="0"/>
+          <a:ext cx="0" cy="0"/>
+          <a:chOff x="0" y="0"/>
+          <a:chExt cx="0" cy="0"/>
+        </a:xfrm>
+      </p:grpSpPr>
+      <p:sp>
+        <p:nvSpPr>
+          <p:cNvPr id="2" name="Slide Image Placeholder 1"/>
+          <p:cNvSpPr>
+            <a:spLocks noGrp="1" noRot="1" noChangeAspect="1"/>
+          </p:cNvSpPr>
+          <p:nvPr>
+            <p:ph type="sldImg"/>
+          </p:nvPr>
+        </p:nvSpPr>
+        <p:spPr/>
+      </p:sp>
+      <p:sp>
+        <p:nvSpPr>
+          <p:cNvPr id="3" name="Notes Placeholder 2"/>
+          <p:cNvSpPr>
+            <a:spLocks noGrp="1"/>
+          </p:cNvSpPr>
+          <p:nvPr>
+            <p:ph type="body" idx="1"/>
+          </p:nvPr>
+        </p:nvSpPr>
+        <p:spPr/>
+        <p:txBody>
+          <a:bodyPr/>
+          <a:lstStyle/>
+          <a:p>
+            <a:endParaRPr lang="en-US" dirty="0"/>
+          </a:p>
+        </p:txBody>
+      </p:sp>
+      <p:sp>
+        <p:nvSpPr>
+          <p:cNvPr id="4" name="Slide Number Placeholder 3"/>
+          <p:cNvSpPr>
+            <a:spLocks noGrp="1"/>
+          </p:cNvSpPr>
+          <p:nvPr>
+            <p:ph type="sldNum" sz="quarter" idx="10"/>
+          </p:nvPr>
+        </p:nvSpPr>
+        <p:spPr/>
+        <p:txBody>
+          <a:bodyPr/>
+          <a:lstStyle/>
+          <a:p>
+            <a:fld id="{DBD033B5-E4C0-4F9D-B175-F7B995E6883E}" type="slidenum">
+              <a:rPr lang="ru-RU" smtClean="0"/>
+              <a:pPr/>
+              <a:t>8</a:t>
+            </a:fld>
+            <a:endParaRPr lang="ru-RU"/>
+          </a:p>
+        </p:txBody>
+      </p:sp>
+    </p:spTree>
+    <p:extLst>
+      <p:ext uri="{BB962C8B-B14F-4D97-AF65-F5344CB8AC3E}">
+        <p14:creationId xmlns:p14="http://schemas.microsoft.com/office/powerpoint/2010/main" val="2724263405"/>
+      </p:ext>
+    </p:extLst>
+  </p:cSld>
+  <p:clrMapOvr>
+    <a:masterClrMapping/>
+  </p:clrMapOvr>
+</p:notes>
+</file>
+
+<file path=ppt/notesSlides/notesSlide5.xml><?xml version="1.0" encoding="utf-8"?>
+<p:notes xmlns:a="http://schemas.openxmlformats.org/drawingml/2006/main" xmlns:r="http://schemas.openxmlformats.org/officeDocument/2006/relationships" xmlns:p="http://schemas.openxmlformats.org/presentationml/2006/main">
+  <p:cSld>
+    <p:spTree>
+      <p:nvGrpSpPr>
+        <p:cNvPr id="1" name=""/>
+        <p:cNvGrpSpPr/>
+        <p:nvPr/>
+      </p:nvGrpSpPr>
+      <p:grpSpPr>
+        <a:xfrm>
+          <a:off x="0" y="0"/>
+          <a:ext cx="0" cy="0"/>
+          <a:chOff x="0" y="0"/>
+          <a:chExt cx="0" cy="0"/>
+        </a:xfrm>
+      </p:grpSpPr>
+      <p:sp>
+        <p:nvSpPr>
+          <p:cNvPr id="2" name="Slide Image Placeholder 1"/>
+          <p:cNvSpPr>
+            <a:spLocks noGrp="1" noRot="1" noChangeAspect="1"/>
+          </p:cNvSpPr>
+          <p:nvPr>
+            <p:ph type="sldImg"/>
+          </p:nvPr>
+        </p:nvSpPr>
+        <p:spPr/>
+      </p:sp>
+      <p:sp>
+        <p:nvSpPr>
+          <p:cNvPr id="3" name="Notes Placeholder 2"/>
+          <p:cNvSpPr>
+            <a:spLocks noGrp="1"/>
+          </p:cNvSpPr>
+          <p:nvPr>
+            <p:ph type="body" idx="1"/>
+          </p:nvPr>
+        </p:nvSpPr>
+        <p:spPr/>
+        <p:txBody>
+          <a:bodyPr/>
+          <a:lstStyle/>
+          <a:p>
+            <a:endParaRPr lang="en-US" dirty="0"/>
+          </a:p>
+        </p:txBody>
+      </p:sp>
+      <p:sp>
+        <p:nvSpPr>
+          <p:cNvPr id="4" name="Slide Number Placeholder 3"/>
+          <p:cNvSpPr>
+            <a:spLocks noGrp="1"/>
+          </p:cNvSpPr>
+          <p:nvPr>
+            <p:ph type="sldNum" sz="quarter" idx="10"/>
+          </p:nvPr>
+        </p:nvSpPr>
+        <p:spPr/>
+        <p:txBody>
+          <a:bodyPr/>
+          <a:lstStyle/>
+          <a:p>
+            <a:fld id="{DBD033B5-E4C0-4F9D-B175-F7B995E6883E}" type="slidenum">
+              <a:rPr lang="ru-RU" smtClean="0"/>
+              <a:pPr/>
+              <a:t>9</a:t>
+            </a:fld>
+            <a:endParaRPr lang="ru-RU"/>
+          </a:p>
+        </p:txBody>
+      </p:sp>
+    </p:spTree>
+    <p:extLst>
+      <p:ext uri="{BB962C8B-B14F-4D97-AF65-F5344CB8AC3E}">
+        <p14:creationId xmlns:p14="http://schemas.microsoft.com/office/powerpoint/2010/main" val="3125603822"/>
+      </p:ext>
+    </p:extLst>
+  </p:cSld>
+  <p:clrMapOvr>
+    <a:masterClrMapping/>
+  </p:clrMapOvr>
+</p:notes>
+</file>
+
+<file path=ppt/notesSlides/notesSlide6.xml><?xml version="1.0" encoding="utf-8"?>
+<p:notes xmlns:a="http://schemas.openxmlformats.org/drawingml/2006/main" xmlns:r="http://schemas.openxmlformats.org/officeDocument/2006/relationships" xmlns:p="http://schemas.openxmlformats.org/presentationml/2006/main">
+  <p:cSld>
+    <p:spTree>
+      <p:nvGrpSpPr>
+        <p:cNvPr id="1" name=""/>
+        <p:cNvGrpSpPr/>
+        <p:nvPr/>
+      </p:nvGrpSpPr>
+      <p:grpSpPr>
+        <a:xfrm>
+          <a:off x="0" y="0"/>
+          <a:ext cx="0" cy="0"/>
+          <a:chOff x="0" y="0"/>
+          <a:chExt cx="0" cy="0"/>
+        </a:xfrm>
+      </p:grpSpPr>
+      <p:sp>
+        <p:nvSpPr>
+          <p:cNvPr id="2" name="Slide Image Placeholder 1"/>
+          <p:cNvSpPr>
+            <a:spLocks noGrp="1" noRot="1" noChangeAspect="1"/>
+          </p:cNvSpPr>
+          <p:nvPr>
+            <p:ph type="sldImg"/>
+          </p:nvPr>
+        </p:nvSpPr>
+        <p:spPr/>
+      </p:sp>
+      <p:sp>
+        <p:nvSpPr>
+          <p:cNvPr id="3" name="Notes Placeholder 2"/>
+          <p:cNvSpPr>
+            <a:spLocks noGrp="1"/>
+          </p:cNvSpPr>
+          <p:nvPr>
+            <p:ph type="body" idx="1"/>
+          </p:nvPr>
+        </p:nvSpPr>
+        <p:spPr/>
+        <p:txBody>
+          <a:bodyPr/>
+          <a:lstStyle/>
+          <a:p>
+            <a:endParaRPr lang="en-US" dirty="0"/>
+          </a:p>
+        </p:txBody>
+      </p:sp>
+      <p:sp>
+        <p:nvSpPr>
+          <p:cNvPr id="4" name="Slide Number Placeholder 3"/>
+          <p:cNvSpPr>
+            <a:spLocks noGrp="1"/>
+          </p:cNvSpPr>
+          <p:nvPr>
+            <p:ph type="sldNum" sz="quarter" idx="10"/>
+          </p:nvPr>
+        </p:nvSpPr>
+        <p:spPr/>
+        <p:txBody>
+          <a:bodyPr/>
+          <a:lstStyle/>
+          <a:p>
+            <a:fld id="{DBD033B5-E4C0-4F9D-B175-F7B995E6883E}" type="slidenum">
+              <a:rPr lang="ru-RU" smtClean="0"/>
+              <a:pPr/>
+              <a:t>10</a:t>
+            </a:fld>
+            <a:endParaRPr lang="ru-RU"/>
+          </a:p>
+        </p:txBody>
+      </p:sp>
+    </p:spTree>
+    <p:extLst>
+      <p:ext uri="{BB962C8B-B14F-4D97-AF65-F5344CB8AC3E}">
+        <p14:creationId xmlns:p14="http://schemas.microsoft.com/office/powerpoint/2010/main" val="2950453467"/>
+      </p:ext>
+    </p:extLst>
+  </p:cSld>
+  <p:clrMapOvr>
+    <a:masterClrMapping/>
+  </p:clrMapOvr>
+</p:notes>
+</file>
+
+<file path=ppt/notesSlides/notesSlide7.xml><?xml version="1.0" encoding="utf-8"?>
+<p:notes xmlns:a="http://schemas.openxmlformats.org/drawingml/2006/main" xmlns:r="http://schemas.openxmlformats.org/officeDocument/2006/relationships" xmlns:p="http://schemas.openxmlformats.org/presentationml/2006/main">
+  <p:cSld>
+    <p:spTree>
+      <p:nvGrpSpPr>
+        <p:cNvPr id="1" name=""/>
+        <p:cNvGrpSpPr/>
+        <p:nvPr/>
+      </p:nvGrpSpPr>
+      <p:grpSpPr>
+        <a:xfrm>
+          <a:off x="0" y="0"/>
+          <a:ext cx="0" cy="0"/>
+          <a:chOff x="0" y="0"/>
+          <a:chExt cx="0" cy="0"/>
+        </a:xfrm>
+      </p:grpSpPr>
+      <p:sp>
+        <p:nvSpPr>
+          <p:cNvPr id="2" name="Slide Image Placeholder 1"/>
+          <p:cNvSpPr>
+            <a:spLocks noGrp="1" noRot="1" noChangeAspect="1"/>
+          </p:cNvSpPr>
+          <p:nvPr>
+            <p:ph type="sldImg"/>
+          </p:nvPr>
+        </p:nvSpPr>
+        <p:spPr/>
+      </p:sp>
+      <p:sp>
+        <p:nvSpPr>
+          <p:cNvPr id="3" name="Notes Placeholder 2"/>
+          <p:cNvSpPr>
+            <a:spLocks noGrp="1"/>
+          </p:cNvSpPr>
+          <p:nvPr>
+            <p:ph type="body" idx="1"/>
+          </p:nvPr>
+        </p:nvSpPr>
+        <p:spPr/>
+        <p:txBody>
+          <a:bodyPr/>
+          <a:lstStyle/>
+          <a:p>
+            <a:endParaRPr lang="en-US" dirty="0"/>
+          </a:p>
+        </p:txBody>
+      </p:sp>
+      <p:sp>
+        <p:nvSpPr>
+          <p:cNvPr id="4" name="Slide Number Placeholder 3"/>
+          <p:cNvSpPr>
+            <a:spLocks noGrp="1"/>
+          </p:cNvSpPr>
+          <p:nvPr>
+            <p:ph type="sldNum" sz="quarter" idx="10"/>
+          </p:nvPr>
+        </p:nvSpPr>
+        <p:spPr/>
+        <p:txBody>
+          <a:bodyPr/>
+          <a:lstStyle/>
+          <a:p>
+            <a:fld id="{DBD033B5-E4C0-4F9D-B175-F7B995E6883E}" type="slidenum">
+              <a:rPr lang="ru-RU" smtClean="0"/>
+              <a:pPr/>
+              <a:t>11</a:t>
+            </a:fld>
+            <a:endParaRPr lang="ru-RU"/>
+          </a:p>
+        </p:txBody>
+      </p:sp>
+    </p:spTree>
+    <p:extLst>
+      <p:ext uri="{BB962C8B-B14F-4D97-AF65-F5344CB8AC3E}">
+        <p14:creationId xmlns:p14="http://schemas.microsoft.com/office/powerpoint/2010/main" val="1731464133"/>
+      </p:ext>
+    </p:extLst>
+  </p:cSld>
+  <p:clrMapOvr>
+    <a:masterClrMapping/>
+  </p:clrMapOvr>
+</p:notes>
 </file>
 
 <file path=ppt/slideLayouts/slideLayout1.xml><?xml version="1.0" encoding="utf-8"?>
@@ -2908,6 +3574,592 @@
 <file path=ppt/slides/slide10.xml><?xml version="1.0" encoding="utf-8"?>
 <p:sld xmlns:a="http://schemas.openxmlformats.org/drawingml/2006/main" xmlns:r="http://schemas.openxmlformats.org/officeDocument/2006/relationships" xmlns:p="http://schemas.openxmlformats.org/presentationml/2006/main">
   <p:cSld>
+    <p:spTree>
+      <p:nvGrpSpPr>
+        <p:cNvPr id="1" name=""/>
+        <p:cNvGrpSpPr/>
+        <p:nvPr/>
+      </p:nvGrpSpPr>
+      <p:grpSpPr>
+        <a:xfrm>
+          <a:off x="0" y="0"/>
+          <a:ext cx="0" cy="0"/>
+          <a:chOff x="0" y="0"/>
+          <a:chExt cx="0" cy="0"/>
+        </a:xfrm>
+      </p:grpSpPr>
+      <p:sp>
+        <p:nvSpPr>
+          <p:cNvPr id="2" name="Title 1"/>
+          <p:cNvSpPr>
+            <a:spLocks noGrp="1"/>
+          </p:cNvSpPr>
+          <p:nvPr>
+            <p:ph type="title"/>
+          </p:nvPr>
+        </p:nvSpPr>
+        <p:spPr/>
+        <p:txBody>
+          <a:bodyPr/>
+          <a:lstStyle/>
+          <a:p>
+            <a:r>
+              <a:rPr lang="en-US" dirty="0"/>
+              <a:t>Data Analysis and Discussion</a:t>
+            </a:r>
+          </a:p>
+        </p:txBody>
+      </p:sp>
+      <p:sp>
+        <p:nvSpPr>
+          <p:cNvPr id="3" name="Content Placeholder 2"/>
+          <p:cNvSpPr>
+            <a:spLocks noGrp="1"/>
+          </p:cNvSpPr>
+          <p:nvPr>
+            <p:ph sz="half" idx="1"/>
+          </p:nvPr>
+        </p:nvSpPr>
+        <p:spPr>
+          <a:xfrm>
+            <a:off x="755576" y="1196752"/>
+            <a:ext cx="8136903" cy="5472336"/>
+          </a:xfrm>
+        </p:spPr>
+        <p:txBody>
+          <a:bodyPr/>
+          <a:lstStyle/>
+          <a:p>
+            <a:pPr marL="0" indent="0">
+              <a:buNone/>
+            </a:pPr>
+            <a:r>
+              <a:rPr lang="en-US" sz="1800" b="1" dirty="0" smtClean="0"/>
+              <a:t>What impact does literacy have on fertility rates in a Nation?</a:t>
+            </a:r>
+          </a:p>
+          <a:p>
+            <a:pPr marL="0" indent="0">
+              <a:buNone/>
+            </a:pPr>
+            <a:r>
+              <a:rPr lang="en-US" sz="1400" dirty="0" smtClean="0"/>
+              <a:t>For all the box is above the 80%</a:t>
+            </a:r>
+          </a:p>
+          <a:p>
+            <a:pPr marL="0" indent="0">
+              <a:buNone/>
+            </a:pPr>
+            <a:endParaRPr lang="en-US" sz="1400" dirty="0"/>
+          </a:p>
+          <a:p>
+            <a:pPr marL="0" indent="0">
+              <a:buNone/>
+            </a:pPr>
+            <a:endParaRPr lang="en-US" sz="1400" dirty="0" smtClean="0"/>
+          </a:p>
+          <a:p>
+            <a:pPr marL="0" indent="0">
+              <a:buNone/>
+            </a:pPr>
+            <a:endParaRPr lang="en-US" sz="1400" dirty="0"/>
+          </a:p>
+          <a:p>
+            <a:pPr marL="0" indent="0">
+              <a:buNone/>
+            </a:pPr>
+            <a:endParaRPr lang="en-US" sz="1400" dirty="0" smtClean="0"/>
+          </a:p>
+          <a:p>
+            <a:pPr marL="0" indent="0">
+              <a:buNone/>
+            </a:pPr>
+            <a:r>
+              <a:rPr lang="en-US" sz="1400" dirty="0" smtClean="0"/>
+              <a:t>Are there any difference in Countries that are above or below Replacement-level fertility?</a:t>
+            </a:r>
+            <a:endParaRPr lang="en-US" sz="1400" dirty="0"/>
+          </a:p>
+          <a:p>
+            <a:endParaRPr lang="en-US" sz="1400" dirty="0" smtClean="0"/>
+          </a:p>
+          <a:p>
+            <a:endParaRPr lang="en-US" sz="1400" dirty="0"/>
+          </a:p>
+          <a:p>
+            <a:r>
+              <a:rPr lang="en-US" sz="1400" dirty="0" smtClean="0"/>
+              <a:t>Mean age </a:t>
+            </a:r>
+            <a:r>
+              <a:rPr lang="en-US" sz="1400" dirty="0" err="1" smtClean="0"/>
+              <a:t>age</a:t>
+            </a:r>
+            <a:r>
+              <a:rPr lang="en-US" sz="1400" dirty="0" smtClean="0"/>
+              <a:t> of childbearing for countries that are above replacement</a:t>
+            </a:r>
+          </a:p>
+          <a:p>
+            <a:endParaRPr lang="en-US" sz="1400" dirty="0"/>
+          </a:p>
+          <a:p>
+            <a:r>
+              <a:rPr lang="en-US" sz="1400" dirty="0" smtClean="0"/>
+              <a:t>Henry’s</a:t>
+            </a:r>
+          </a:p>
+          <a:p>
+            <a:endParaRPr lang="en-US" sz="1400" dirty="0" smtClean="0"/>
+          </a:p>
+        </p:txBody>
+      </p:sp>
+    </p:spTree>
+    <p:extLst>
+      <p:ext uri="{BB962C8B-B14F-4D97-AF65-F5344CB8AC3E}">
+        <p14:creationId xmlns:p14="http://schemas.microsoft.com/office/powerpoint/2010/main" val="46290858"/>
+      </p:ext>
+    </p:extLst>
+  </p:cSld>
+  <p:clrMapOvr>
+    <a:masterClrMapping/>
+  </p:clrMapOvr>
+</p:sld>
+</file>
+
+<file path=ppt/slides/slide11.xml><?xml version="1.0" encoding="utf-8"?>
+<p:sld xmlns:a="http://schemas.openxmlformats.org/drawingml/2006/main" xmlns:r="http://schemas.openxmlformats.org/officeDocument/2006/relationships" xmlns:p="http://schemas.openxmlformats.org/presentationml/2006/main">
+  <p:cSld>
+    <p:spTree>
+      <p:nvGrpSpPr>
+        <p:cNvPr id="1" name=""/>
+        <p:cNvGrpSpPr/>
+        <p:nvPr/>
+      </p:nvGrpSpPr>
+      <p:grpSpPr>
+        <a:xfrm>
+          <a:off x="0" y="0"/>
+          <a:ext cx="0" cy="0"/>
+          <a:chOff x="0" y="0"/>
+          <a:chExt cx="0" cy="0"/>
+        </a:xfrm>
+      </p:grpSpPr>
+      <p:sp>
+        <p:nvSpPr>
+          <p:cNvPr id="2" name="Title 1"/>
+          <p:cNvSpPr>
+            <a:spLocks noGrp="1"/>
+          </p:cNvSpPr>
+          <p:nvPr>
+            <p:ph type="title"/>
+          </p:nvPr>
+        </p:nvSpPr>
+        <p:spPr/>
+        <p:txBody>
+          <a:bodyPr/>
+          <a:lstStyle/>
+          <a:p>
+            <a:r>
+              <a:rPr lang="en-US" dirty="0"/>
+              <a:t>Data Analysis and Discussion</a:t>
+            </a:r>
+          </a:p>
+        </p:txBody>
+      </p:sp>
+      <p:sp>
+        <p:nvSpPr>
+          <p:cNvPr id="3" name="Content Placeholder 2"/>
+          <p:cNvSpPr>
+            <a:spLocks noGrp="1"/>
+          </p:cNvSpPr>
+          <p:nvPr>
+            <p:ph sz="half" idx="1"/>
+          </p:nvPr>
+        </p:nvSpPr>
+        <p:spPr/>
+        <p:txBody>
+          <a:bodyPr/>
+          <a:lstStyle/>
+          <a:p>
+            <a:r>
+              <a:rPr lang="en-US" sz="1400" b="1" dirty="0"/>
+              <a:t>What is the ranking of factors that affect fertility?</a:t>
+            </a:r>
+          </a:p>
+          <a:p>
+            <a:pPr lvl="1"/>
+            <a:r>
+              <a:rPr lang="en-US" sz="1400" dirty="0"/>
+              <a:t>Literacy</a:t>
+            </a:r>
+          </a:p>
+          <a:p>
+            <a:pPr lvl="1"/>
+            <a:r>
+              <a:rPr lang="en-US" sz="1400" dirty="0"/>
+              <a:t>Age</a:t>
+            </a:r>
+          </a:p>
+          <a:p>
+            <a:pPr lvl="1"/>
+            <a:r>
+              <a:rPr lang="en-US" sz="1400" dirty="0"/>
+              <a:t>Female participation in work </a:t>
+            </a:r>
+            <a:r>
+              <a:rPr lang="en-US" sz="1400" dirty="0" smtClean="0"/>
+              <a:t>force</a:t>
+            </a:r>
+          </a:p>
+          <a:p>
+            <a:r>
+              <a:rPr lang="en-US" sz="1400" dirty="0" smtClean="0"/>
+              <a:t>Discuss </a:t>
+            </a:r>
+            <a:r>
+              <a:rPr lang="en-US" sz="1400" dirty="0"/>
+              <a:t>the steps you took to analyze the data and answer each question you asked in your proposal </a:t>
+            </a:r>
+          </a:p>
+          <a:p>
+            <a:r>
+              <a:rPr lang="en-US" sz="1400" dirty="0"/>
+              <a:t>Present and discuss interesting figures developed during analysis with the help of </a:t>
+            </a:r>
+            <a:r>
+              <a:rPr lang="en-US" sz="1400" dirty="0" err="1"/>
+              <a:t>Jupyter</a:t>
+            </a:r>
+            <a:r>
+              <a:rPr lang="en-US" sz="1400" dirty="0"/>
+              <a:t> </a:t>
+            </a:r>
+            <a:r>
+              <a:rPr lang="en-US" sz="1400" dirty="0" smtClean="0"/>
+              <a:t>Notebook</a:t>
+            </a:r>
+          </a:p>
+          <a:p>
+            <a:r>
+              <a:rPr lang="en-US" sz="1400" dirty="0"/>
+              <a:t>Discuss your findings. Did you find what you expected to find? If not, why not? What inferences or general conclusions can you draw from your analysis?</a:t>
+            </a:r>
+          </a:p>
+        </p:txBody>
+      </p:sp>
+      <p:sp>
+        <p:nvSpPr>
+          <p:cNvPr id="4" name="Content Placeholder 3"/>
+          <p:cNvSpPr>
+            <a:spLocks noGrp="1"/>
+          </p:cNvSpPr>
+          <p:nvPr>
+            <p:ph sz="half" idx="2"/>
+          </p:nvPr>
+        </p:nvSpPr>
+        <p:spPr/>
+        <p:txBody>
+          <a:bodyPr/>
+          <a:lstStyle/>
+          <a:p>
+            <a:pPr marL="0" indent="0">
+              <a:buNone/>
+            </a:pPr>
+            <a:endParaRPr lang="en-US" dirty="0"/>
+          </a:p>
+        </p:txBody>
+      </p:sp>
+    </p:spTree>
+    <p:extLst>
+      <p:ext uri="{BB962C8B-B14F-4D97-AF65-F5344CB8AC3E}">
+        <p14:creationId xmlns:p14="http://schemas.microsoft.com/office/powerpoint/2010/main" val="386076692"/>
+      </p:ext>
+    </p:extLst>
+  </p:cSld>
+  <p:clrMapOvr>
+    <a:masterClrMapping/>
+  </p:clrMapOvr>
+</p:sld>
+</file>
+
+<file path=ppt/slides/slide12.xml><?xml version="1.0" encoding="utf-8"?>
+<p:sld xmlns:a="http://schemas.openxmlformats.org/drawingml/2006/main" xmlns:r="http://schemas.openxmlformats.org/officeDocument/2006/relationships" xmlns:p="http://schemas.openxmlformats.org/presentationml/2006/main">
+  <p:cSld>
+    <p:spTree>
+      <p:nvGrpSpPr>
+        <p:cNvPr id="1" name=""/>
+        <p:cNvGrpSpPr/>
+        <p:nvPr/>
+      </p:nvGrpSpPr>
+      <p:grpSpPr>
+        <a:xfrm>
+          <a:off x="0" y="0"/>
+          <a:ext cx="0" cy="0"/>
+          <a:chOff x="0" y="0"/>
+          <a:chExt cx="0" cy="0"/>
+        </a:xfrm>
+      </p:grpSpPr>
+      <p:sp>
+        <p:nvSpPr>
+          <p:cNvPr id="2" name="Title 1"/>
+          <p:cNvSpPr>
+            <a:spLocks noGrp="1"/>
+          </p:cNvSpPr>
+          <p:nvPr>
+            <p:ph type="title"/>
+          </p:nvPr>
+        </p:nvSpPr>
+        <p:spPr/>
+        <p:txBody>
+          <a:bodyPr/>
+          <a:lstStyle/>
+          <a:p>
+            <a:r>
+              <a:rPr lang="en-US" dirty="0"/>
+              <a:t>Data Analysis and Discussion</a:t>
+            </a:r>
+          </a:p>
+        </p:txBody>
+      </p:sp>
+      <p:sp>
+        <p:nvSpPr>
+          <p:cNvPr id="3" name="Content Placeholder 2"/>
+          <p:cNvSpPr>
+            <a:spLocks noGrp="1"/>
+          </p:cNvSpPr>
+          <p:nvPr>
+            <p:ph sz="half" idx="1"/>
+          </p:nvPr>
+        </p:nvSpPr>
+        <p:spPr/>
+        <p:txBody>
+          <a:bodyPr/>
+          <a:lstStyle/>
+          <a:p>
+            <a:r>
+              <a:rPr lang="en-US" sz="1400" b="1" dirty="0"/>
+              <a:t>Where are fertility rates increasing and decreasing in comparison to literacy </a:t>
+            </a:r>
+            <a:r>
+              <a:rPr lang="en-US" sz="1400" b="1" dirty="0" smtClean="0"/>
+              <a:t>rates?</a:t>
+            </a:r>
+          </a:p>
+          <a:p>
+            <a:endParaRPr lang="en-US" sz="1400" dirty="0" smtClean="0"/>
+          </a:p>
+          <a:p>
+            <a:r>
+              <a:rPr lang="en-US" sz="1400" dirty="0" smtClean="0"/>
+              <a:t>Discuss </a:t>
+            </a:r>
+            <a:r>
+              <a:rPr lang="en-US" sz="1400" dirty="0"/>
+              <a:t>the steps you took to analyze the data and answer each question you asked in your proposal </a:t>
+            </a:r>
+          </a:p>
+          <a:p>
+            <a:r>
+              <a:rPr lang="en-US" sz="1400" dirty="0"/>
+              <a:t>Present and discuss interesting figures developed during analysis with the help of </a:t>
+            </a:r>
+            <a:r>
+              <a:rPr lang="en-US" sz="1400" dirty="0" err="1"/>
+              <a:t>Jupyter</a:t>
+            </a:r>
+            <a:r>
+              <a:rPr lang="en-US" sz="1400" dirty="0"/>
+              <a:t> </a:t>
+            </a:r>
+            <a:r>
+              <a:rPr lang="en-US" sz="1400" dirty="0" smtClean="0"/>
+              <a:t>Notebook</a:t>
+            </a:r>
+          </a:p>
+          <a:p>
+            <a:r>
+              <a:rPr lang="en-US" sz="1400" dirty="0"/>
+              <a:t>Discuss your findings. Did you find what you expected to find? If not, why not? What inferences or general conclusions can you draw from your analysis?</a:t>
+            </a:r>
+          </a:p>
+        </p:txBody>
+      </p:sp>
+      <p:sp>
+        <p:nvSpPr>
+          <p:cNvPr id="4" name="Content Placeholder 3"/>
+          <p:cNvSpPr>
+            <a:spLocks noGrp="1"/>
+          </p:cNvSpPr>
+          <p:nvPr>
+            <p:ph sz="half" idx="2"/>
+          </p:nvPr>
+        </p:nvSpPr>
+        <p:spPr/>
+        <p:txBody>
+          <a:bodyPr/>
+          <a:lstStyle/>
+          <a:p>
+            <a:pPr marL="0" indent="0">
+              <a:buNone/>
+            </a:pPr>
+            <a:endParaRPr lang="en-US" dirty="0"/>
+          </a:p>
+        </p:txBody>
+      </p:sp>
+    </p:spTree>
+    <p:extLst>
+      <p:ext uri="{BB962C8B-B14F-4D97-AF65-F5344CB8AC3E}">
+        <p14:creationId xmlns:p14="http://schemas.microsoft.com/office/powerpoint/2010/main" val="2238332124"/>
+      </p:ext>
+    </p:extLst>
+  </p:cSld>
+  <p:clrMapOvr>
+    <a:masterClrMapping/>
+  </p:clrMapOvr>
+</p:sld>
+</file>
+
+<file path=ppt/slides/slide13.xml><?xml version="1.0" encoding="utf-8"?>
+<p:sld xmlns:a="http://schemas.openxmlformats.org/drawingml/2006/main" xmlns:r="http://schemas.openxmlformats.org/officeDocument/2006/relationships" xmlns:p="http://schemas.openxmlformats.org/presentationml/2006/main">
+  <p:cSld>
+    <p:spTree>
+      <p:nvGrpSpPr>
+        <p:cNvPr id="1" name=""/>
+        <p:cNvGrpSpPr/>
+        <p:nvPr/>
+      </p:nvGrpSpPr>
+      <p:grpSpPr>
+        <a:xfrm>
+          <a:off x="0" y="0"/>
+          <a:ext cx="0" cy="0"/>
+          <a:chOff x="0" y="0"/>
+          <a:chExt cx="0" cy="0"/>
+        </a:xfrm>
+      </p:grpSpPr>
+      <p:sp>
+        <p:nvSpPr>
+          <p:cNvPr id="2" name="Title 1"/>
+          <p:cNvSpPr>
+            <a:spLocks noGrp="1"/>
+          </p:cNvSpPr>
+          <p:nvPr>
+            <p:ph type="title"/>
+          </p:nvPr>
+        </p:nvSpPr>
+        <p:spPr/>
+        <p:txBody>
+          <a:bodyPr/>
+          <a:lstStyle/>
+          <a:p>
+            <a:r>
+              <a:rPr lang="en-US" dirty="0"/>
+              <a:t>Data Analysis and Discussion</a:t>
+            </a:r>
+          </a:p>
+        </p:txBody>
+      </p:sp>
+      <p:sp>
+        <p:nvSpPr>
+          <p:cNvPr id="3" name="Content Placeholder 2"/>
+          <p:cNvSpPr>
+            <a:spLocks noGrp="1"/>
+          </p:cNvSpPr>
+          <p:nvPr>
+            <p:ph sz="half" idx="1"/>
+          </p:nvPr>
+        </p:nvSpPr>
+        <p:spPr/>
+        <p:txBody>
+          <a:bodyPr/>
+          <a:lstStyle/>
+          <a:p>
+            <a:r>
+              <a:rPr lang="en-US" sz="1400" b="1" dirty="0"/>
+              <a:t>How has the age of childbearing changed over time</a:t>
+            </a:r>
+            <a:r>
+              <a:rPr lang="en-US" sz="1400" b="1" dirty="0" smtClean="0"/>
+              <a:t>?</a:t>
+            </a:r>
+          </a:p>
+          <a:p>
+            <a:endParaRPr lang="en-US" sz="1400" dirty="0" smtClean="0"/>
+          </a:p>
+          <a:p>
+            <a:r>
+              <a:rPr lang="en-US" sz="1400" dirty="0" smtClean="0"/>
+              <a:t>Discuss </a:t>
+            </a:r>
+            <a:r>
+              <a:rPr lang="en-US" sz="1400" dirty="0"/>
+              <a:t>the steps you took to analyze the data and answer each question you asked in your proposal </a:t>
+            </a:r>
+          </a:p>
+          <a:p>
+            <a:r>
+              <a:rPr lang="en-US" sz="1400" dirty="0"/>
+              <a:t>Present and discuss interesting figures developed during analysis with the help of </a:t>
+            </a:r>
+            <a:r>
+              <a:rPr lang="en-US" sz="1400" dirty="0" err="1"/>
+              <a:t>Jupyter</a:t>
+            </a:r>
+            <a:r>
+              <a:rPr lang="en-US" sz="1400" dirty="0"/>
+              <a:t> </a:t>
+            </a:r>
+            <a:r>
+              <a:rPr lang="en-US" sz="1400" dirty="0" smtClean="0"/>
+              <a:t>Notebook</a:t>
+            </a:r>
+          </a:p>
+          <a:p>
+            <a:r>
+              <a:rPr lang="en-US" sz="1400" dirty="0"/>
+              <a:t>Discuss your findings. Did you find what you expected to find? If not, why not? What inferences or general conclusions can you draw from your analysis?</a:t>
+            </a:r>
+          </a:p>
+        </p:txBody>
+      </p:sp>
+      <p:sp>
+        <p:nvSpPr>
+          <p:cNvPr id="4" name="Content Placeholder 3"/>
+          <p:cNvSpPr>
+            <a:spLocks noGrp="1"/>
+          </p:cNvSpPr>
+          <p:nvPr>
+            <p:ph sz="half" idx="2"/>
+          </p:nvPr>
+        </p:nvSpPr>
+        <p:spPr/>
+        <p:txBody>
+          <a:bodyPr/>
+          <a:lstStyle/>
+          <a:p>
+            <a:pPr marL="0" indent="0">
+              <a:buNone/>
+            </a:pPr>
+            <a:endParaRPr lang="en-US" dirty="0"/>
+          </a:p>
+        </p:txBody>
+      </p:sp>
+    </p:spTree>
+    <p:extLst>
+      <p:ext uri="{BB962C8B-B14F-4D97-AF65-F5344CB8AC3E}">
+        <p14:creationId xmlns:p14="http://schemas.microsoft.com/office/powerpoint/2010/main" val="275733070"/>
+      </p:ext>
+    </p:extLst>
+  </p:cSld>
+  <p:clrMapOvr>
+    <a:masterClrMapping/>
+  </p:clrMapOvr>
+</p:sld>
+</file>
+
+<file path=ppt/slides/slide14.xml><?xml version="1.0" encoding="utf-8"?>
+<p:sld xmlns:a="http://schemas.openxmlformats.org/drawingml/2006/main" xmlns:r="http://schemas.openxmlformats.org/officeDocument/2006/relationships" xmlns:p="http://schemas.openxmlformats.org/presentationml/2006/main">
+  <p:cSld>
     <p:bg>
       <p:bgPr>
         <a:blipFill dpi="0" rotWithShape="0">
@@ -2946,6 +4198,138 @@
         </p:nvSpPr>
         <p:spPr>
           <a:xfrm>
+            <a:off x="1908175" y="188913"/>
+            <a:ext cx="6911975" cy="723900"/>
+          </a:xfrm>
+        </p:spPr>
+        <p:txBody>
+          <a:bodyPr/>
+          <a:lstStyle/>
+          <a:p>
+            <a:r>
+              <a:rPr lang="en-US" dirty="0" smtClean="0">
+                <a:solidFill>
+                  <a:schemeClr val="tx1"/>
+                </a:solidFill>
+              </a:rPr>
+              <a:t>Post Mortem</a:t>
+            </a:r>
+            <a:endParaRPr lang="en-US" dirty="0">
+              <a:solidFill>
+                <a:schemeClr val="tx1"/>
+              </a:solidFill>
+            </a:endParaRPr>
+          </a:p>
+        </p:txBody>
+      </p:sp>
+      <p:sp>
+        <p:nvSpPr>
+          <p:cNvPr id="114691" name="Rectangle 3"/>
+          <p:cNvSpPr>
+            <a:spLocks noGrp="1" noChangeArrowheads="1"/>
+          </p:cNvSpPr>
+          <p:nvPr>
+            <p:ph type="body" idx="1"/>
+          </p:nvPr>
+        </p:nvSpPr>
+        <p:spPr>
+          <a:xfrm>
+            <a:off x="1908175" y="1052513"/>
+            <a:ext cx="6911975" cy="5473700"/>
+          </a:xfrm>
+        </p:spPr>
+        <p:txBody>
+          <a:bodyPr/>
+          <a:lstStyle/>
+          <a:p>
+            <a:r>
+              <a:rPr lang="en-US" sz="1400" dirty="0"/>
+              <a:t>Discuss any difficulties that arose, and how you dealt with them </a:t>
+            </a:r>
+            <a:endParaRPr lang="en-US" sz="1400" dirty="0" smtClean="0"/>
+          </a:p>
+          <a:p>
+            <a:r>
+              <a:rPr lang="en-US" sz="1400" dirty="0" smtClean="0"/>
+              <a:t>Discuss </a:t>
+            </a:r>
+            <a:r>
+              <a:rPr lang="en-US" sz="1400" dirty="0"/>
+              <a:t>any additional questions that came up, but which you didn't have time to answer: </a:t>
+            </a:r>
+            <a:endParaRPr lang="en-US" sz="1400" dirty="0" smtClean="0"/>
+          </a:p>
+          <a:p>
+            <a:r>
+              <a:rPr lang="en-US" sz="1400" dirty="0" smtClean="0"/>
+              <a:t>What </a:t>
+            </a:r>
+            <a:r>
+              <a:rPr lang="en-US" sz="1400" dirty="0"/>
+              <a:t>would you research next, if you had two more weeks?</a:t>
+            </a:r>
+            <a:endParaRPr lang="en-US" sz="1400" dirty="0">
+              <a:solidFill>
+                <a:schemeClr val="tx1"/>
+              </a:solidFill>
+            </a:endParaRPr>
+          </a:p>
+        </p:txBody>
+      </p:sp>
+    </p:spTree>
+    <p:extLst>
+      <p:ext uri="{BB962C8B-B14F-4D97-AF65-F5344CB8AC3E}">
+        <p14:creationId xmlns:p14="http://schemas.microsoft.com/office/powerpoint/2010/main" val="4282824275"/>
+      </p:ext>
+    </p:extLst>
+  </p:cSld>
+  <p:clrMapOvr>
+    <a:masterClrMapping/>
+  </p:clrMapOvr>
+</p:sld>
+</file>
+
+<file path=ppt/slides/slide15.xml><?xml version="1.0" encoding="utf-8"?>
+<p:sld xmlns:a="http://schemas.openxmlformats.org/drawingml/2006/main" xmlns:r="http://schemas.openxmlformats.org/officeDocument/2006/relationships" xmlns:p="http://schemas.openxmlformats.org/presentationml/2006/main">
+  <p:cSld>
+    <p:bg>
+      <p:bgPr>
+        <a:blipFill dpi="0" rotWithShape="0">
+          <a:blip r:embed="rId2"/>
+          <a:srcRect/>
+          <a:stretch>
+            <a:fillRect/>
+          </a:stretch>
+        </a:blipFill>
+        <a:effectLst/>
+      </p:bgPr>
+    </p:bg>
+    <p:spTree>
+      <p:nvGrpSpPr>
+        <p:cNvPr id="1" name=""/>
+        <p:cNvGrpSpPr/>
+        <p:nvPr/>
+      </p:nvGrpSpPr>
+      <p:grpSpPr>
+        <a:xfrm>
+          <a:off x="0" y="0"/>
+          <a:ext cx="0" cy="0"/>
+          <a:chOff x="0" y="0"/>
+          <a:chExt cx="0" cy="0"/>
+        </a:xfrm>
+      </p:grpSpPr>
+      <p:sp>
+        <p:nvSpPr>
+          <p:cNvPr id="114690" name="Rectangle 2"/>
+          <p:cNvSpPr>
+            <a:spLocks noGrp="1" noChangeArrowheads="1"/>
+          </p:cNvSpPr>
+          <p:nvPr>
+            <p:ph type="title"/>
+          </p:nvPr>
+        </p:nvSpPr>
+        <p:spPr>
+          <a:xfrm>
             <a:off x="1908175" y="188912"/>
             <a:ext cx="6911975" cy="6408439"/>
           </a:xfrm>
@@ -2955,14 +4339,6 @@
           <a:lstStyle/>
           <a:p>
             <a:pPr algn="ctr"/>
-            <a:r>
-              <a:rPr lang="en-US" dirty="0" smtClean="0">
-                <a:solidFill>
-                  <a:schemeClr val="tx1"/>
-                </a:solidFill>
-              </a:rPr>
-              <a:t>Questions</a:t>
-            </a:r>
             <a:endParaRPr lang="en-US" dirty="0">
               <a:solidFill>
                 <a:schemeClr val="tx1"/>
@@ -3045,8 +4421,8 @@
         </p:nvSpPr>
         <p:spPr>
           <a:xfrm>
-            <a:off x="1116013" y="1684338"/>
-            <a:ext cx="6770687" cy="4768850"/>
+            <a:off x="251520" y="2708920"/>
+            <a:ext cx="8784975" cy="4149080"/>
           </a:xfrm>
         </p:spPr>
         <p:txBody>
@@ -3085,15 +4461,21 @@
             </a:r>
           </a:p>
           <a:p>
-            <a:pPr>
+            <a:pPr marL="457200" lvl="1" indent="0">
               <a:lnSpc>
                 <a:spcPct val="80000"/>
               </a:lnSpc>
-            </a:pPr>
-            <a:endParaRPr lang="en-US" altLang="ko-KR" sz="1400" dirty="0">
-              <a:latin typeface="Verdana" pitchFamily="34" charset="0"/>
-              <a:ea typeface="굴림" charset="-127"/>
-            </a:endParaRPr>
+              <a:buNone/>
+            </a:pPr>
+            <a:r>
+              <a:rPr lang="en-US" sz="1000" b="1" dirty="0"/>
+              <a:t>Tracking fertility rates can allow for more beneficial planning and resource allocation in a particular </a:t>
+            </a:r>
+            <a:r>
+              <a:rPr lang="en-US" sz="1000" b="1" dirty="0" smtClean="0"/>
+              <a:t>region. The Total Fertility Rate is the most widely used fertility measurement. Our problem was to determine if fertility rates were higher due to a lower levels of literacy in the Country. We also wanted to explore other factors that affect fertility, such as age and income.</a:t>
+            </a:r>
+            <a:endParaRPr lang="en-US" altLang="ko-KR" sz="1000" b="1" dirty="0"/>
           </a:p>
           <a:p>
             <a:pPr>
@@ -3114,14 +4496,34 @@
             </a:endParaRPr>
           </a:p>
           <a:p>
-            <a:pPr lvl="1"/>
+            <a:pPr lvl="1">
+              <a:buFont typeface="+mj-lt"/>
+              <a:buAutoNum type="arabicPeriod"/>
+            </a:pPr>
             <a:r>
               <a:rPr lang="en-US" sz="1000" dirty="0"/>
-              <a:t>Do literacy rates effect fertility rates by age?</a:t>
-            </a:r>
-          </a:p>
-          <a:p>
-            <a:pPr lvl="1"/>
+              <a:t>Do literacy rates effect fertility </a:t>
+            </a:r>
+            <a:r>
+              <a:rPr lang="en-US" sz="1000" dirty="0" smtClean="0"/>
+              <a:t>rates? </a:t>
+            </a:r>
+          </a:p>
+          <a:p>
+            <a:pPr marL="857250" lvl="2" indent="0">
+              <a:buNone/>
+            </a:pPr>
+            <a:r>
+              <a:rPr lang="en-US" sz="1000" dirty="0" smtClean="0"/>
+              <a:t>While this is a broad question, we wanted to understand how literacy in a country impacts the fertility rate. We also wanted to understand how fertility rates impact population and where is a Replacement level of fertility?</a:t>
+            </a:r>
+            <a:endParaRPr lang="en-US" sz="1000" dirty="0"/>
+          </a:p>
+          <a:p>
+            <a:pPr lvl="1">
+              <a:buFont typeface="+mj-lt"/>
+              <a:buAutoNum type="arabicPeriod" startAt="2"/>
+            </a:pPr>
             <a:r>
               <a:rPr lang="en-US" sz="1000" dirty="0"/>
               <a:t>What is the ranking of factors that affect fertility</a:t>
@@ -3132,51 +4534,93 @@
             </a:r>
           </a:p>
           <a:p>
-            <a:pPr lvl="1"/>
+            <a:pPr marL="914400" lvl="2" indent="0">
+              <a:buNone/>
+            </a:pPr>
             <a:r>
               <a:rPr lang="en-US" sz="1000" dirty="0" smtClean="0"/>
-              <a:t>Where </a:t>
-            </a:r>
+              <a:t>We wanted to know what data factors where important in determining their impact on fertility. We needed to see if literacy plays a part in affecting fertility.</a:t>
+            </a:r>
+            <a:endParaRPr lang="en-US" sz="1000" dirty="0" smtClean="0"/>
+          </a:p>
+          <a:p>
+            <a:pPr lvl="1">
+              <a:buFont typeface="+mj-lt"/>
+              <a:buAutoNum type="arabicPeriod" startAt="2"/>
+            </a:pPr>
             <a:r>
               <a:rPr lang="en-US" sz="1000" dirty="0"/>
-              <a:t>are fertility rates increasing and decreasing in comparison to literacy rates?</a:t>
-            </a:r>
-          </a:p>
-          <a:p>
-            <a:pPr lvl="1"/>
+              <a:t>Where are fertility rates increasing and decreasing in comparison to literacy rates</a:t>
+            </a:r>
+            <a:r>
+              <a:rPr lang="en-US" sz="1000" dirty="0" smtClean="0"/>
+              <a:t>?</a:t>
+            </a:r>
+          </a:p>
+          <a:p>
+            <a:pPr marL="914400" lvl="2" indent="0">
+              <a:buNone/>
+            </a:pPr>
+            <a:r>
+              <a:rPr lang="en-US" sz="1000" dirty="0" smtClean="0"/>
+              <a:t>This gives us a better understanding if we know the relationship between literacy rates and fertility rates. </a:t>
+            </a:r>
+            <a:endParaRPr lang="en-US" sz="1000" dirty="0"/>
+          </a:p>
+          <a:p>
+            <a:pPr lvl="1">
+              <a:buFont typeface="+mj-lt"/>
+              <a:buAutoNum type="arabicPeriod" startAt="2"/>
+            </a:pPr>
             <a:r>
               <a:rPr lang="en-US" sz="1000" dirty="0"/>
               <a:t>How has the age of childbearing changed over time?</a:t>
             </a:r>
           </a:p>
           <a:p>
-            <a:pPr lvl="1">
-              <a:lnSpc>
-                <a:spcPct val="80000"/>
-              </a:lnSpc>
-            </a:pPr>
+            <a:pPr marL="857250" lvl="2" indent="0">
+              <a:buNone/>
+            </a:pPr>
+            <a:r>
+              <a:rPr lang="en-US" sz="1000" dirty="0" smtClean="0"/>
+              <a:t>Our assumption was see if this would help us rank the factors affecting fertility.</a:t>
+            </a:r>
             <a:endParaRPr lang="en-US" sz="1600" dirty="0">
               <a:latin typeface="Verdana" pitchFamily="34" charset="0"/>
               <a:ea typeface="굴림" charset="-127"/>
             </a:endParaRPr>
           </a:p>
-          <a:p>
-            <a:pPr>
-              <a:lnSpc>
-                <a:spcPct val="80000"/>
-              </a:lnSpc>
-            </a:pPr>
-            <a:r>
-              <a:rPr lang="en-US" sz="1400" dirty="0">
-                <a:latin typeface="Verdana" pitchFamily="34" charset="0"/>
-                <a:ea typeface="굴림" charset="-127"/>
+        </p:txBody>
+      </p:sp>
+      <p:sp>
+        <p:nvSpPr>
+          <p:cNvPr id="3" name="TextBox 2"/>
+          <p:cNvSpPr txBox="1"/>
+          <p:nvPr/>
+        </p:nvSpPr>
+        <p:spPr>
+          <a:xfrm>
+            <a:off x="899592" y="1844824"/>
+            <a:ext cx="1296144" cy="369332"/>
+          </a:xfrm>
+          <a:prstGeom prst="rect">
+            <a:avLst/>
+          </a:prstGeom>
+          <a:noFill/>
+        </p:spPr>
+        <p:txBody>
+          <a:bodyPr wrap="square" rtlCol="0">
+            <a:spAutoFit/>
+          </a:bodyPr>
+          <a:lstStyle/>
+          <a:p>
+            <a:r>
+              <a:rPr lang="en-US" dirty="0" smtClean="0">
+                <a:hlinkClick r:id="rId2"/>
               </a:rPr>
-              <a:t>Describe whether you were able to answer these questions to your satisfaction, and briefly summarize your findings</a:t>
-            </a:r>
-            <a:endParaRPr lang="uk-UA" sz="1400" dirty="0">
-              <a:latin typeface="Verdana" pitchFamily="34" charset="0"/>
-              <a:ea typeface="굴림" charset="-127"/>
-            </a:endParaRPr>
+              <a:t>Population</a:t>
+            </a:r>
+            <a:endParaRPr lang="en-US" dirty="0"/>
           </a:p>
         </p:txBody>
       </p:sp>
@@ -3196,6 +4640,157 @@
 </file>
 
 <file path=ppt/slides/slide3.xml><?xml version="1.0" encoding="utf-8"?>
+<p:sld xmlns:a="http://schemas.openxmlformats.org/drawingml/2006/main" xmlns:r="http://schemas.openxmlformats.org/officeDocument/2006/relationships" xmlns:p="http://schemas.openxmlformats.org/presentationml/2006/main">
+  <p:cSld>
+    <p:spTree>
+      <p:nvGrpSpPr>
+        <p:cNvPr id="1" name=""/>
+        <p:cNvGrpSpPr/>
+        <p:nvPr/>
+      </p:nvGrpSpPr>
+      <p:grpSpPr>
+        <a:xfrm>
+          <a:off x="0" y="0"/>
+          <a:ext cx="0" cy="0"/>
+          <a:chOff x="0" y="0"/>
+          <a:chExt cx="0" cy="0"/>
+        </a:xfrm>
+      </p:grpSpPr>
+      <p:sp>
+        <p:nvSpPr>
+          <p:cNvPr id="36866" name="Rectangle 2"/>
+          <p:cNvSpPr>
+            <a:spLocks noGrp="1" noChangeArrowheads="1"/>
+          </p:cNvSpPr>
+          <p:nvPr>
+            <p:ph type="title"/>
+          </p:nvPr>
+        </p:nvSpPr>
+        <p:spPr>
+          <a:xfrm>
+            <a:off x="2051050" y="188913"/>
+            <a:ext cx="6840538" cy="649287"/>
+          </a:xfrm>
+        </p:spPr>
+        <p:txBody>
+          <a:bodyPr/>
+          <a:lstStyle/>
+          <a:p>
+            <a:r>
+              <a:rPr lang="en-US" sz="3200" dirty="0" smtClean="0">
+                <a:latin typeface="Tahoma" charset="0"/>
+              </a:rPr>
+              <a:t>Motivation and Summary Slide</a:t>
+            </a:r>
+            <a:endParaRPr lang="uk-UA" sz="3200" dirty="0">
+              <a:latin typeface="Tahoma" charset="0"/>
+            </a:endParaRPr>
+          </a:p>
+        </p:txBody>
+      </p:sp>
+      <p:sp>
+        <p:nvSpPr>
+          <p:cNvPr id="36867" name="Rectangle 3"/>
+          <p:cNvSpPr>
+            <a:spLocks noGrp="1" noChangeArrowheads="1"/>
+          </p:cNvSpPr>
+          <p:nvPr>
+            <p:ph type="body" idx="1"/>
+          </p:nvPr>
+        </p:nvSpPr>
+        <p:spPr>
+          <a:xfrm>
+            <a:off x="1116013" y="1684338"/>
+            <a:ext cx="6770687" cy="4768850"/>
+          </a:xfrm>
+        </p:spPr>
+        <p:txBody>
+          <a:bodyPr/>
+          <a:lstStyle/>
+          <a:p>
+            <a:pPr>
+              <a:lnSpc>
+                <a:spcPct val="80000"/>
+              </a:lnSpc>
+            </a:pPr>
+            <a:endParaRPr lang="en-US" altLang="ko-KR" sz="2000" dirty="0" smtClean="0">
+              <a:latin typeface="Verdana" pitchFamily="34" charset="0"/>
+              <a:ea typeface="굴림" charset="-127"/>
+            </a:endParaRPr>
+          </a:p>
+          <a:p>
+            <a:pPr>
+              <a:lnSpc>
+                <a:spcPct val="80000"/>
+              </a:lnSpc>
+            </a:pPr>
+            <a:r>
+              <a:rPr lang="en-US" sz="1400" dirty="0" smtClean="0">
+                <a:latin typeface="Verdana" pitchFamily="34" charset="0"/>
+                <a:ea typeface="굴림" charset="-127"/>
+              </a:rPr>
+              <a:t>Describe </a:t>
+            </a:r>
+            <a:r>
+              <a:rPr lang="en-US" sz="1400" dirty="0">
+                <a:latin typeface="Verdana" pitchFamily="34" charset="0"/>
+                <a:ea typeface="굴림" charset="-127"/>
+              </a:rPr>
+              <a:t>whether you were able to answer these questions to your satisfaction, and briefly summarize your </a:t>
+            </a:r>
+            <a:r>
+              <a:rPr lang="en-US" sz="1400" dirty="0" smtClean="0">
+                <a:latin typeface="Verdana" pitchFamily="34" charset="0"/>
+                <a:ea typeface="굴림" charset="-127"/>
+              </a:rPr>
+              <a:t>findings</a:t>
+            </a:r>
+          </a:p>
+          <a:p>
+            <a:pPr>
+              <a:lnSpc>
+                <a:spcPct val="80000"/>
+              </a:lnSpc>
+            </a:pPr>
+            <a:endParaRPr lang="en-US" sz="1400" dirty="0" smtClean="0">
+              <a:latin typeface="Verdana" pitchFamily="34" charset="0"/>
+              <a:ea typeface="굴림" charset="-127"/>
+            </a:endParaRPr>
+          </a:p>
+          <a:p>
+            <a:pPr lvl="1">
+              <a:lnSpc>
+                <a:spcPct val="80000"/>
+              </a:lnSpc>
+            </a:pPr>
+            <a:endParaRPr lang="en-US" sz="1000" dirty="0" smtClean="0">
+              <a:latin typeface="Verdana" pitchFamily="34" charset="0"/>
+              <a:ea typeface="굴림" charset="-127"/>
+            </a:endParaRPr>
+          </a:p>
+        </p:txBody>
+      </p:sp>
+    </p:spTree>
+    <p:extLst>
+      <p:ext uri="{BB962C8B-B14F-4D97-AF65-F5344CB8AC3E}">
+        <p14:creationId xmlns:p14="http://schemas.microsoft.com/office/powerpoint/2010/main" val="953388928"/>
+      </p:ext>
+    </p:extLst>
+  </p:cSld>
+  <p:clrMapOvr>
+    <a:masterClrMapping/>
+  </p:clrMapOvr>
+  <p:timing>
+    <p:tnLst>
+      <p:par>
+        <p:cTn id="1" dur="indefinite" restart="never" nodeType="tmRoot"/>
+      </p:par>
+    </p:tnLst>
+  </p:timing>
+</p:sld>
+</file>
+
+<file path=ppt/slides/slide4.xml><?xml version="1.0" encoding="utf-8"?>
 <p:sld xmlns:a="http://schemas.openxmlformats.org/drawingml/2006/main" xmlns:r="http://schemas.openxmlformats.org/officeDocument/2006/relationships" xmlns:p="http://schemas.openxmlformats.org/presentationml/2006/main">
   <p:cSld>
     <p:spTree>
@@ -3406,8 +5001,26 @@
             </a:r>
             <a:r>
               <a:rPr lang="en-US" sz="1400" dirty="0" smtClean="0"/>
-              <a:t>it</a:t>
-            </a:r>
+              <a:t>it.</a:t>
+            </a:r>
+          </a:p>
+          <a:p>
+            <a:pPr marL="0" indent="0">
+              <a:lnSpc>
+                <a:spcPct val="80000"/>
+              </a:lnSpc>
+              <a:buNone/>
+            </a:pPr>
+            <a:endParaRPr lang="en-US" sz="1400" dirty="0"/>
+          </a:p>
+          <a:p>
+            <a:pPr marL="0" indent="0">
+              <a:lnSpc>
+                <a:spcPct val="80000"/>
+              </a:lnSpc>
+              <a:buNone/>
+            </a:pPr>
+            <a:endParaRPr lang="en-US" sz="1400" dirty="0" smtClean="0"/>
           </a:p>
           <a:p>
             <a:pPr marL="0" indent="0">
@@ -3433,10 +5046,17 @@
   <p:clrMapOvr>
     <a:masterClrMapping/>
   </p:clrMapOvr>
+  <p:timing>
+    <p:tnLst>
+      <p:par>
+        <p:cTn id="1" dur="indefinite" restart="never" nodeType="tmRoot"/>
+      </p:par>
+    </p:tnLst>
+  </p:timing>
 </p:sld>
 </file>
 
-<file path=ppt/slides/slide4.xml><?xml version="1.0" encoding="utf-8"?>
+<file path=ppt/slides/slide5.xml><?xml version="1.0" encoding="utf-8"?>
 <p:sld xmlns:a="http://schemas.openxmlformats.org/drawingml/2006/main" xmlns:r="http://schemas.openxmlformats.org/officeDocument/2006/relationships" xmlns:p="http://schemas.openxmlformats.org/presentationml/2006/main">
   <p:cSld>
     <p:spTree>
@@ -3693,11 +5313,7 @@
             </a:pPr>
             <a:r>
               <a:rPr lang="en-US" sz="1000" dirty="0" smtClean="0"/>
-              <a:t>Final Data fram</a:t>
-            </a:r>
-            <a:r>
-              <a:rPr lang="en-US" sz="1000" dirty="0" smtClean="0"/>
-              <a:t>e was created – </a:t>
+              <a:t>Final Data frame was created – </a:t>
             </a:r>
             <a:r>
               <a:rPr lang="en-US" sz="1000" dirty="0" err="1" smtClean="0"/>
@@ -3784,25 +5400,6 @@
             <a:endParaRPr lang="en-US" sz="1400" dirty="0" smtClean="0"/>
           </a:p>
           <a:p>
-            <a:pPr>
-              <a:lnSpc>
-                <a:spcPct val="80000"/>
-              </a:lnSpc>
-            </a:pPr>
-            <a:r>
-              <a:rPr lang="en-US" sz="1400" dirty="0" smtClean="0"/>
-              <a:t>Discuss </a:t>
-            </a:r>
-            <a:r>
-              <a:rPr lang="en-US" sz="1400" dirty="0"/>
-              <a:t>insights you had while exploring the data that you didn't </a:t>
-            </a:r>
-            <a:r>
-              <a:rPr lang="en-US" sz="1400" dirty="0" smtClean="0"/>
-              <a:t>anticipate</a:t>
-            </a:r>
-          </a:p>
-          <a:p>
             <a:pPr lvl="1">
               <a:lnSpc>
                 <a:spcPct val="80000"/>
@@ -3810,7 +5407,11 @@
             </a:pPr>
             <a:r>
               <a:rPr lang="en-US" sz="1000" dirty="0" smtClean="0"/>
-              <a:t>We did not anticipate a mismatch between countries and data. There was a lot of variability between the number of years and what years were listed for each country</a:t>
+              <a:t>We </a:t>
+            </a:r>
+            <a:r>
+              <a:rPr lang="en-US" sz="1000" dirty="0" smtClean="0"/>
+              <a:t>did not anticipate a mismatch between countries and data. There was a lot of variability between the number of years and what years were listed for each country</a:t>
             </a:r>
             <a:endParaRPr lang="en-US" sz="1000" dirty="0"/>
           </a:p>
@@ -3932,6 +5533,41 @@
                 <a:spcPct val="80000"/>
               </a:lnSpc>
             </a:pPr>
+            <a:r>
+              <a:rPr lang="en-US" altLang="ko-KR" sz="1000" kern="0" dirty="0" smtClean="0">
+                <a:latin typeface="Verdana" pitchFamily="34" charset="0"/>
+                <a:ea typeface="굴림" charset="-127"/>
+              </a:rPr>
+              <a:t>Mappings of </a:t>
+            </a:r>
+          </a:p>
+          <a:p>
+            <a:pPr lvl="1">
+              <a:lnSpc>
+                <a:spcPct val="80000"/>
+              </a:lnSpc>
+            </a:pPr>
+            <a:r>
+              <a:rPr lang="en-US" altLang="ko-KR" sz="1000" kern="0" dirty="0" smtClean="0">
+                <a:latin typeface="Verdana" pitchFamily="34" charset="0"/>
+                <a:ea typeface="굴림" charset="-127"/>
+              </a:rPr>
+              <a:t>Scatterplots of </a:t>
+            </a:r>
+          </a:p>
+          <a:p>
+            <a:pPr lvl="1">
+              <a:lnSpc>
+                <a:spcPct val="80000"/>
+              </a:lnSpc>
+            </a:pPr>
+            <a:r>
+              <a:rPr lang="en-US" altLang="ko-KR" sz="1000" kern="0" dirty="0" smtClean="0">
+                <a:latin typeface="Verdana" pitchFamily="34" charset="0"/>
+                <a:ea typeface="굴림" charset="-127"/>
+              </a:rPr>
+              <a:t>Statistics and Graphs of </a:t>
+            </a:r>
             <a:endParaRPr lang="en-US" altLang="ko-KR" sz="1000" kern="0" dirty="0" smtClean="0">
               <a:latin typeface="Verdana" pitchFamily="34" charset="0"/>
               <a:ea typeface="굴림" charset="-127"/>
@@ -3949,139 +5585,13 @@
   <p:clrMapOvr>
     <a:masterClrMapping/>
   </p:clrMapOvr>
-</p:sld>
-</file>
-
-<file path=ppt/slides/slide5.xml><?xml version="1.0" encoding="utf-8"?>
-<p:sld xmlns:a="http://schemas.openxmlformats.org/drawingml/2006/main" xmlns:r="http://schemas.openxmlformats.org/officeDocument/2006/relationships" xmlns:p="http://schemas.openxmlformats.org/presentationml/2006/main">
-  <p:cSld>
-    <p:spTree>
-      <p:nvGrpSpPr>
-        <p:cNvPr id="1" name=""/>
-        <p:cNvGrpSpPr/>
-        <p:nvPr/>
-      </p:nvGrpSpPr>
-      <p:grpSpPr>
-        <a:xfrm>
-          <a:off x="0" y="0"/>
-          <a:ext cx="0" cy="0"/>
-          <a:chOff x="0" y="0"/>
-          <a:chExt cx="0" cy="0"/>
-        </a:xfrm>
-      </p:grpSpPr>
-      <p:sp>
-        <p:nvSpPr>
-          <p:cNvPr id="2" name="Title 1"/>
-          <p:cNvSpPr>
-            <a:spLocks noGrp="1"/>
-          </p:cNvSpPr>
-          <p:nvPr>
-            <p:ph type="title"/>
-          </p:nvPr>
-        </p:nvSpPr>
-        <p:spPr/>
-        <p:txBody>
-          <a:bodyPr/>
-          <a:lstStyle/>
-          <a:p>
-            <a:r>
-              <a:rPr lang="en-US" dirty="0"/>
-              <a:t>Data Analysis and Discussion</a:t>
-            </a:r>
-          </a:p>
-        </p:txBody>
-      </p:sp>
-      <p:sp>
-        <p:nvSpPr>
-          <p:cNvPr id="3" name="Content Placeholder 2"/>
-          <p:cNvSpPr>
-            <a:spLocks noGrp="1"/>
-          </p:cNvSpPr>
-          <p:nvPr>
-            <p:ph sz="half" idx="1"/>
-          </p:nvPr>
-        </p:nvSpPr>
-        <p:spPr/>
-        <p:txBody>
-          <a:bodyPr/>
-          <a:lstStyle/>
-          <a:p>
-            <a:r>
-              <a:rPr lang="en-US" sz="1400" b="1" dirty="0"/>
-              <a:t>Do literacy rates effect fertility rates by age?</a:t>
-            </a:r>
-          </a:p>
-          <a:p>
-            <a:endParaRPr lang="en-US" sz="1400" dirty="0" smtClean="0"/>
-          </a:p>
-          <a:p>
-            <a:r>
-              <a:rPr lang="en-US" sz="1400" dirty="0" smtClean="0"/>
-              <a:t>Discuss </a:t>
-            </a:r>
-            <a:r>
-              <a:rPr lang="en-US" sz="1400" dirty="0"/>
-              <a:t>the steps you took to analyze the data and answer each question you asked in your proposal </a:t>
-            </a:r>
-          </a:p>
-          <a:p>
-            <a:r>
-              <a:rPr lang="en-US" sz="1400" dirty="0"/>
-              <a:t>Present and discuss interesting figures developed during analysis with the help of </a:t>
-            </a:r>
-            <a:r>
-              <a:rPr lang="en-US" sz="1400" dirty="0" err="1"/>
-              <a:t>Jupyter</a:t>
-            </a:r>
-            <a:r>
-              <a:rPr lang="en-US" sz="1400" dirty="0"/>
-              <a:t> </a:t>
-            </a:r>
-            <a:r>
-              <a:rPr lang="en-US" sz="1400" dirty="0" smtClean="0"/>
-              <a:t>Notebook</a:t>
-            </a:r>
-          </a:p>
-          <a:p>
-            <a:r>
-              <a:rPr lang="en-US" sz="1400" dirty="0"/>
-              <a:t>Discuss your findings. Did you find what you expected to find? If not, why not? What inferences or general conclusions can you draw from your analysis?</a:t>
-            </a:r>
-          </a:p>
-        </p:txBody>
-      </p:sp>
-      <p:sp>
-        <p:nvSpPr>
-          <p:cNvPr id="4" name="Content Placeholder 3"/>
-          <p:cNvSpPr>
-            <a:spLocks noGrp="1"/>
-          </p:cNvSpPr>
-          <p:nvPr>
-            <p:ph sz="half" idx="2"/>
-          </p:nvPr>
-        </p:nvSpPr>
-        <p:spPr/>
-        <p:txBody>
-          <a:bodyPr/>
-          <a:lstStyle/>
-          <a:p>
-            <a:pPr marL="0" indent="0">
-              <a:buNone/>
-            </a:pPr>
-            <a:endParaRPr lang="en-US" dirty="0"/>
-          </a:p>
-        </p:txBody>
-      </p:sp>
-    </p:spTree>
-    <p:extLst>
-      <p:ext uri="{BB962C8B-B14F-4D97-AF65-F5344CB8AC3E}">
-        <p14:creationId xmlns:p14="http://schemas.microsoft.com/office/powerpoint/2010/main" val="46290858"/>
-      </p:ext>
-    </p:extLst>
-  </p:cSld>
-  <p:clrMapOvr>
-    <a:masterClrMapping/>
-  </p:clrMapOvr>
+  <p:timing>
+    <p:tnLst>
+      <p:par>
+        <p:cTn id="1" dur="indefinite" restart="never" nodeType="tmRoot"/>
+      </p:par>
+    </p:tnLst>
+  </p:timing>
 </p:sld>
 </file>
 
@@ -4118,120 +5628,251 @@
           <a:lstStyle/>
           <a:p>
             <a:r>
-              <a:rPr lang="en-US" dirty="0"/>
-              <a:t>Data Analysis and Discussion</a:t>
-            </a:r>
+              <a:rPr lang="en-US" dirty="0" smtClean="0"/>
+              <a:t>Data Cleanup and Exploration</a:t>
+            </a:r>
+            <a:endParaRPr lang="en-US" dirty="0"/>
           </a:p>
         </p:txBody>
       </p:sp>
       <p:sp>
         <p:nvSpPr>
-          <p:cNvPr id="3" name="Content Placeholder 2"/>
-          <p:cNvSpPr>
-            <a:spLocks noGrp="1"/>
-          </p:cNvSpPr>
-          <p:nvPr>
-            <p:ph sz="half" idx="1"/>
-          </p:nvPr>
-        </p:nvSpPr>
-        <p:spPr/>
+          <p:cNvPr id="3" name="Rectangle 3"/>
+          <p:cNvSpPr txBox="1">
+            <a:spLocks noChangeArrowheads="1"/>
+          </p:cNvSpPr>
+          <p:nvPr/>
+        </p:nvSpPr>
+        <p:spPr>
+          <a:xfrm>
+            <a:off x="899593" y="1412776"/>
+            <a:ext cx="7488832" cy="792088"/>
+          </a:xfrm>
+          <a:prstGeom prst="rect">
+            <a:avLst/>
+          </a:prstGeom>
+        </p:spPr>
+        <p:style>
+          <a:lnRef idx="2">
+            <a:schemeClr val="accent3"/>
+          </a:lnRef>
+          <a:fillRef idx="1">
+            <a:schemeClr val="lt1"/>
+          </a:fillRef>
+          <a:effectRef idx="0">
+            <a:schemeClr val="accent3"/>
+          </a:effectRef>
+          <a:fontRef idx="minor">
+            <a:schemeClr val="dk1"/>
+          </a:fontRef>
+        </p:style>
         <p:txBody>
           <a:bodyPr/>
-          <a:lstStyle/>
-          <a:p>
-            <a:r>
-              <a:rPr lang="en-US" sz="1400" b="1" dirty="0"/>
-              <a:t>What is the ranking of factors that affect fertility?</a:t>
-            </a:r>
-          </a:p>
-          <a:p>
-            <a:pPr lvl="1"/>
+          <a:lstStyle>
+            <a:lvl1pPr marL="342900" indent="-342900" algn="l" rtl="0" fontAlgn="base">
+              <a:spcBef>
+                <a:spcPct val="20000"/>
+              </a:spcBef>
+              <a:spcAft>
+                <a:spcPct val="0"/>
+              </a:spcAft>
+              <a:buChar char="•"/>
+              <a:defRPr sz="2800">
+                <a:solidFill>
+                  <a:schemeClr val="tx2"/>
+                </a:solidFill>
+                <a:latin typeface="+mn-lt"/>
+                <a:ea typeface="+mn-ea"/>
+                <a:cs typeface="+mn-cs"/>
+              </a:defRPr>
+            </a:lvl1pPr>
+            <a:lvl2pPr marL="742950" indent="-285750" algn="l" rtl="0" fontAlgn="base">
+              <a:spcBef>
+                <a:spcPct val="20000"/>
+              </a:spcBef>
+              <a:spcAft>
+                <a:spcPct val="0"/>
+              </a:spcAft>
+              <a:buChar char="–"/>
+              <a:defRPr sz="2400" b="1">
+                <a:solidFill>
+                  <a:schemeClr val="tx2"/>
+                </a:solidFill>
+                <a:latin typeface="+mn-lt"/>
+              </a:defRPr>
+            </a:lvl2pPr>
+            <a:lvl3pPr marL="1143000" indent="-228600" algn="l" rtl="0" fontAlgn="base">
+              <a:spcBef>
+                <a:spcPct val="20000"/>
+              </a:spcBef>
+              <a:spcAft>
+                <a:spcPct val="0"/>
+              </a:spcAft>
+              <a:buChar char="•"/>
+              <a:defRPr sz="2400">
+                <a:solidFill>
+                  <a:schemeClr val="tx2"/>
+                </a:solidFill>
+                <a:latin typeface="+mn-lt"/>
+              </a:defRPr>
+            </a:lvl3pPr>
+            <a:lvl4pPr marL="1600200" indent="-228600" algn="l" rtl="0" fontAlgn="base">
+              <a:spcBef>
+                <a:spcPct val="20000"/>
+              </a:spcBef>
+              <a:spcAft>
+                <a:spcPct val="0"/>
+              </a:spcAft>
+              <a:buChar char="–"/>
+              <a:defRPr sz="2000">
+                <a:solidFill>
+                  <a:schemeClr val="tx2"/>
+                </a:solidFill>
+                <a:latin typeface="+mn-lt"/>
+              </a:defRPr>
+            </a:lvl4pPr>
+            <a:lvl5pPr marL="2057400" indent="-228600" algn="l" rtl="0" fontAlgn="base">
+              <a:spcBef>
+                <a:spcPct val="20000"/>
+              </a:spcBef>
+              <a:spcAft>
+                <a:spcPct val="0"/>
+              </a:spcAft>
+              <a:buChar char="»"/>
+              <a:defRPr sz="2000">
+                <a:solidFill>
+                  <a:schemeClr val="tx2"/>
+                </a:solidFill>
+                <a:latin typeface="+mn-lt"/>
+              </a:defRPr>
+            </a:lvl5pPr>
+            <a:lvl6pPr marL="2514600" indent="-228600" algn="l" rtl="0" fontAlgn="base">
+              <a:spcBef>
+                <a:spcPct val="20000"/>
+              </a:spcBef>
+              <a:spcAft>
+                <a:spcPct val="0"/>
+              </a:spcAft>
+              <a:buChar char="»"/>
+              <a:defRPr sz="2000">
+                <a:solidFill>
+                  <a:schemeClr val="tx2"/>
+                </a:solidFill>
+                <a:latin typeface="+mn-lt"/>
+              </a:defRPr>
+            </a:lvl6pPr>
+            <a:lvl7pPr marL="2971800" indent="-228600" algn="l" rtl="0" fontAlgn="base">
+              <a:spcBef>
+                <a:spcPct val="20000"/>
+              </a:spcBef>
+              <a:spcAft>
+                <a:spcPct val="0"/>
+              </a:spcAft>
+              <a:buChar char="»"/>
+              <a:defRPr sz="2000">
+                <a:solidFill>
+                  <a:schemeClr val="tx2"/>
+                </a:solidFill>
+                <a:latin typeface="+mn-lt"/>
+              </a:defRPr>
+            </a:lvl7pPr>
+            <a:lvl8pPr marL="3429000" indent="-228600" algn="l" rtl="0" fontAlgn="base">
+              <a:spcBef>
+                <a:spcPct val="20000"/>
+              </a:spcBef>
+              <a:spcAft>
+                <a:spcPct val="0"/>
+              </a:spcAft>
+              <a:buChar char="»"/>
+              <a:defRPr sz="2000">
+                <a:solidFill>
+                  <a:schemeClr val="tx2"/>
+                </a:solidFill>
+                <a:latin typeface="+mn-lt"/>
+              </a:defRPr>
+            </a:lvl8pPr>
+            <a:lvl9pPr marL="3886200" indent="-228600" algn="l" rtl="0" fontAlgn="base">
+              <a:spcBef>
+                <a:spcPct val="20000"/>
+              </a:spcBef>
+              <a:spcAft>
+                <a:spcPct val="0"/>
+              </a:spcAft>
+              <a:buChar char="»"/>
+              <a:defRPr sz="2000">
+                <a:solidFill>
+                  <a:schemeClr val="tx2"/>
+                </a:solidFill>
+                <a:latin typeface="+mn-lt"/>
+              </a:defRPr>
+            </a:lvl9pPr>
+          </a:lstStyle>
+          <a:p>
+            <a:pPr marL="0" indent="0" algn="ctr">
+              <a:lnSpc>
+                <a:spcPct val="80000"/>
+              </a:lnSpc>
+              <a:buNone/>
+            </a:pPr>
+            <a:r>
+              <a:rPr lang="en-US" sz="1800" dirty="0"/>
+              <a:t>Describe the exploration and cleanup </a:t>
+            </a:r>
+            <a:r>
+              <a:rPr lang="en-US" sz="1800" dirty="0" smtClean="0"/>
+              <a:t>process</a:t>
+            </a:r>
+          </a:p>
+          <a:p>
+            <a:pPr marL="457200" lvl="1" indent="0">
+              <a:lnSpc>
+                <a:spcPct val="80000"/>
+              </a:lnSpc>
+              <a:buNone/>
+            </a:pPr>
             <a:r>
               <a:rPr lang="en-US" sz="1400" dirty="0"/>
-              <a:t>Literacy</a:t>
-            </a:r>
-          </a:p>
-          <a:p>
-            <a:pPr lvl="1"/>
-            <a:r>
-              <a:rPr lang="en-US" sz="1400" dirty="0"/>
-              <a:t>Age</a:t>
-            </a:r>
-          </a:p>
-          <a:p>
-            <a:pPr lvl="1"/>
-            <a:r>
-              <a:rPr lang="en-US" sz="1400" dirty="0"/>
-              <a:t>Female participation in work </a:t>
-            </a:r>
-            <a:r>
-              <a:rPr lang="en-US" sz="1400" dirty="0" smtClean="0"/>
-              <a:t>force</a:t>
-            </a:r>
+              <a:t>Age-specific fertility rates, Total fertility and .csv – this was our first data file that we started exploring. </a:t>
+            </a:r>
+          </a:p>
+          <a:p>
+            <a:pPr lvl="1">
+              <a:lnSpc>
+                <a:spcPct val="80000"/>
+              </a:lnSpc>
+            </a:pPr>
             <a:endParaRPr lang="en-US" sz="1400" dirty="0" smtClean="0"/>
           </a:p>
-          <a:p>
-            <a:r>
-              <a:rPr lang="en-US" sz="1400" dirty="0" smtClean="0"/>
-              <a:t>Discuss </a:t>
-            </a:r>
-            <a:r>
-              <a:rPr lang="en-US" sz="1400" dirty="0"/>
-              <a:t>the steps you took to analyze the data and answer each question you asked in your proposal </a:t>
-            </a:r>
-          </a:p>
-          <a:p>
-            <a:r>
-              <a:rPr lang="en-US" sz="1400" dirty="0"/>
-              <a:t>Present and discuss interesting figures developed during analysis with the help of </a:t>
-            </a:r>
-            <a:r>
-              <a:rPr lang="en-US" sz="1400" dirty="0" err="1"/>
-              <a:t>Jupyter</a:t>
-            </a:r>
-            <a:r>
-              <a:rPr lang="en-US" sz="1400" dirty="0"/>
-              <a:t> </a:t>
-            </a:r>
-            <a:r>
-              <a:rPr lang="en-US" sz="1400" dirty="0" smtClean="0"/>
-              <a:t>Notebook</a:t>
-            </a:r>
-          </a:p>
-          <a:p>
-            <a:r>
-              <a:rPr lang="en-US" sz="1400" dirty="0"/>
-              <a:t>Discuss your findings. Did you find what you expected to find? If not, why not? What inferences or general conclusions can you draw from your analysis?</a:t>
-            </a:r>
-          </a:p>
         </p:txBody>
       </p:sp>
-      <p:sp>
-        <p:nvSpPr>
-          <p:cNvPr id="4" name="Content Placeholder 3"/>
-          <p:cNvSpPr>
-            <a:spLocks noGrp="1"/>
-          </p:cNvSpPr>
-          <p:nvPr>
-            <p:ph sz="half" idx="2"/>
-          </p:nvPr>
-        </p:nvSpPr>
-        <p:spPr/>
-        <p:txBody>
-          <a:bodyPr/>
-          <a:lstStyle/>
-          <a:p>
-            <a:pPr marL="0" indent="0">
-              <a:buNone/>
-            </a:pPr>
-            <a:endParaRPr lang="en-US" dirty="0"/>
-          </a:p>
-        </p:txBody>
-      </p:sp>
+      <p:pic>
+        <p:nvPicPr>
+          <p:cNvPr id="5" name="Picture 4"/>
+          <p:cNvPicPr>
+            <a:picLocks noChangeAspect="1"/>
+          </p:cNvPicPr>
+          <p:nvPr/>
+        </p:nvPicPr>
+        <p:blipFill>
+          <a:blip r:embed="rId3"/>
+          <a:stretch>
+            <a:fillRect/>
+          </a:stretch>
+        </p:blipFill>
+        <p:spPr>
+          <a:xfrm>
+            <a:off x="539552" y="2183495"/>
+            <a:ext cx="7972313" cy="3189721"/>
+          </a:xfrm>
+          <a:prstGeom prst="rect">
+            <a:avLst/>
+          </a:prstGeom>
+        </p:spPr>
+      </p:pic>
     </p:spTree>
     <p:extLst>
       <p:ext uri="{BB962C8B-B14F-4D97-AF65-F5344CB8AC3E}">
-        <p14:creationId xmlns:p14="http://schemas.microsoft.com/office/powerpoint/2010/main" val="386076692"/>
+        <p14:creationId xmlns:p14="http://schemas.microsoft.com/office/powerpoint/2010/main" val="3480628366"/>
       </p:ext>
     </p:extLst>
   </p:cSld>
@@ -4274,102 +5915,227 @@
           <a:lstStyle/>
           <a:p>
             <a:r>
-              <a:rPr lang="en-US" dirty="0"/>
-              <a:t>Data Analysis and Discussion</a:t>
-            </a:r>
+              <a:rPr lang="en-US" dirty="0" smtClean="0"/>
+              <a:t>Data Cleanup and Exploration</a:t>
+            </a:r>
+            <a:endParaRPr lang="en-US" dirty="0"/>
           </a:p>
         </p:txBody>
       </p:sp>
       <p:sp>
         <p:nvSpPr>
-          <p:cNvPr id="3" name="Content Placeholder 2"/>
-          <p:cNvSpPr>
-            <a:spLocks noGrp="1"/>
-          </p:cNvSpPr>
-          <p:nvPr>
-            <p:ph sz="half" idx="1"/>
-          </p:nvPr>
-        </p:nvSpPr>
-        <p:spPr/>
+          <p:cNvPr id="3" name="Rectangle 3"/>
+          <p:cNvSpPr txBox="1">
+            <a:spLocks noChangeArrowheads="1"/>
+          </p:cNvSpPr>
+          <p:nvPr/>
+        </p:nvSpPr>
+        <p:spPr>
+          <a:xfrm>
+            <a:off x="899592" y="1484784"/>
+            <a:ext cx="7704855" cy="5112568"/>
+          </a:xfrm>
+          <a:prstGeom prst="rect">
+            <a:avLst/>
+          </a:prstGeom>
+        </p:spPr>
+        <p:style>
+          <a:lnRef idx="2">
+            <a:schemeClr val="accent3"/>
+          </a:lnRef>
+          <a:fillRef idx="1">
+            <a:schemeClr val="lt1"/>
+          </a:fillRef>
+          <a:effectRef idx="0">
+            <a:schemeClr val="accent3"/>
+          </a:effectRef>
+          <a:fontRef idx="minor">
+            <a:schemeClr val="dk1"/>
+          </a:fontRef>
+        </p:style>
         <p:txBody>
           <a:bodyPr/>
-          <a:lstStyle/>
-          <a:p>
-            <a:r>
-              <a:rPr lang="en-US" sz="1400" b="1" dirty="0"/>
-              <a:t>Where are fertility rates increasing and decreasing in comparison to literacy </a:t>
-            </a:r>
-            <a:r>
-              <a:rPr lang="en-US" sz="1400" b="1" dirty="0" smtClean="0"/>
-              <a:t>rates?</a:t>
-            </a:r>
-            <a:endParaRPr lang="en-US" sz="1400" b="1" dirty="0" smtClean="0"/>
-          </a:p>
-          <a:p>
-            <a:endParaRPr lang="en-US" sz="1400" dirty="0" smtClean="0"/>
-          </a:p>
-          <a:p>
-            <a:r>
-              <a:rPr lang="en-US" sz="1400" dirty="0" smtClean="0"/>
-              <a:t>Discuss </a:t>
-            </a:r>
+          <a:lstStyle>
+            <a:lvl1pPr marL="342900" indent="-342900" algn="l" rtl="0" fontAlgn="base">
+              <a:spcBef>
+                <a:spcPct val="20000"/>
+              </a:spcBef>
+              <a:spcAft>
+                <a:spcPct val="0"/>
+              </a:spcAft>
+              <a:buChar char="•"/>
+              <a:defRPr sz="2800">
+                <a:solidFill>
+                  <a:schemeClr val="tx2"/>
+                </a:solidFill>
+                <a:latin typeface="+mn-lt"/>
+                <a:ea typeface="+mn-ea"/>
+                <a:cs typeface="+mn-cs"/>
+              </a:defRPr>
+            </a:lvl1pPr>
+            <a:lvl2pPr marL="742950" indent="-285750" algn="l" rtl="0" fontAlgn="base">
+              <a:spcBef>
+                <a:spcPct val="20000"/>
+              </a:spcBef>
+              <a:spcAft>
+                <a:spcPct val="0"/>
+              </a:spcAft>
+              <a:buChar char="–"/>
+              <a:defRPr sz="2400" b="1">
+                <a:solidFill>
+                  <a:schemeClr val="tx2"/>
+                </a:solidFill>
+                <a:latin typeface="+mn-lt"/>
+              </a:defRPr>
+            </a:lvl2pPr>
+            <a:lvl3pPr marL="1143000" indent="-228600" algn="l" rtl="0" fontAlgn="base">
+              <a:spcBef>
+                <a:spcPct val="20000"/>
+              </a:spcBef>
+              <a:spcAft>
+                <a:spcPct val="0"/>
+              </a:spcAft>
+              <a:buChar char="•"/>
+              <a:defRPr sz="2400">
+                <a:solidFill>
+                  <a:schemeClr val="tx2"/>
+                </a:solidFill>
+                <a:latin typeface="+mn-lt"/>
+              </a:defRPr>
+            </a:lvl3pPr>
+            <a:lvl4pPr marL="1600200" indent="-228600" algn="l" rtl="0" fontAlgn="base">
+              <a:spcBef>
+                <a:spcPct val="20000"/>
+              </a:spcBef>
+              <a:spcAft>
+                <a:spcPct val="0"/>
+              </a:spcAft>
+              <a:buChar char="–"/>
+              <a:defRPr sz="2000">
+                <a:solidFill>
+                  <a:schemeClr val="tx2"/>
+                </a:solidFill>
+                <a:latin typeface="+mn-lt"/>
+              </a:defRPr>
+            </a:lvl4pPr>
+            <a:lvl5pPr marL="2057400" indent="-228600" algn="l" rtl="0" fontAlgn="base">
+              <a:spcBef>
+                <a:spcPct val="20000"/>
+              </a:spcBef>
+              <a:spcAft>
+                <a:spcPct val="0"/>
+              </a:spcAft>
+              <a:buChar char="»"/>
+              <a:defRPr sz="2000">
+                <a:solidFill>
+                  <a:schemeClr val="tx2"/>
+                </a:solidFill>
+                <a:latin typeface="+mn-lt"/>
+              </a:defRPr>
+            </a:lvl5pPr>
+            <a:lvl6pPr marL="2514600" indent="-228600" algn="l" rtl="0" fontAlgn="base">
+              <a:spcBef>
+                <a:spcPct val="20000"/>
+              </a:spcBef>
+              <a:spcAft>
+                <a:spcPct val="0"/>
+              </a:spcAft>
+              <a:buChar char="»"/>
+              <a:defRPr sz="2000">
+                <a:solidFill>
+                  <a:schemeClr val="tx2"/>
+                </a:solidFill>
+                <a:latin typeface="+mn-lt"/>
+              </a:defRPr>
+            </a:lvl6pPr>
+            <a:lvl7pPr marL="2971800" indent="-228600" algn="l" rtl="0" fontAlgn="base">
+              <a:spcBef>
+                <a:spcPct val="20000"/>
+              </a:spcBef>
+              <a:spcAft>
+                <a:spcPct val="0"/>
+              </a:spcAft>
+              <a:buChar char="»"/>
+              <a:defRPr sz="2000">
+                <a:solidFill>
+                  <a:schemeClr val="tx2"/>
+                </a:solidFill>
+                <a:latin typeface="+mn-lt"/>
+              </a:defRPr>
+            </a:lvl7pPr>
+            <a:lvl8pPr marL="3429000" indent="-228600" algn="l" rtl="0" fontAlgn="base">
+              <a:spcBef>
+                <a:spcPct val="20000"/>
+              </a:spcBef>
+              <a:spcAft>
+                <a:spcPct val="0"/>
+              </a:spcAft>
+              <a:buChar char="»"/>
+              <a:defRPr sz="2000">
+                <a:solidFill>
+                  <a:schemeClr val="tx2"/>
+                </a:solidFill>
+                <a:latin typeface="+mn-lt"/>
+              </a:defRPr>
+            </a:lvl8pPr>
+            <a:lvl9pPr marL="3886200" indent="-228600" algn="l" rtl="0" fontAlgn="base">
+              <a:spcBef>
+                <a:spcPct val="20000"/>
+              </a:spcBef>
+              <a:spcAft>
+                <a:spcPct val="0"/>
+              </a:spcAft>
+              <a:buChar char="»"/>
+              <a:defRPr sz="2000">
+                <a:solidFill>
+                  <a:schemeClr val="tx2"/>
+                </a:solidFill>
+                <a:latin typeface="+mn-lt"/>
+              </a:defRPr>
+            </a:lvl9pPr>
+          </a:lstStyle>
+          <a:p>
+            <a:pPr marL="0" indent="0" algn="ctr">
+              <a:lnSpc>
+                <a:spcPct val="80000"/>
+              </a:lnSpc>
+              <a:buNone/>
+            </a:pPr>
             <a:r>
               <a:rPr lang="en-US" sz="1400" dirty="0"/>
-              <a:t>the steps you took to analyze the data and answer each question you asked in your proposal </a:t>
-            </a:r>
-          </a:p>
-          <a:p>
-            <a:r>
-              <a:rPr lang="en-US" sz="1400" dirty="0"/>
-              <a:t>Present and discuss interesting figures developed during analysis with the help of </a:t>
-            </a:r>
-            <a:r>
-              <a:rPr lang="en-US" sz="1400" dirty="0" err="1"/>
-              <a:t>Jupyter</a:t>
-            </a:r>
-            <a:r>
-              <a:rPr lang="en-US" sz="1400" dirty="0"/>
-              <a:t> </a:t>
-            </a:r>
-            <a:r>
-              <a:rPr lang="en-US" sz="1400" dirty="0" smtClean="0"/>
-              <a:t>Notebook</a:t>
-            </a:r>
-          </a:p>
-          <a:p>
-            <a:r>
-              <a:rPr lang="en-US" sz="1400" dirty="0"/>
-              <a:t>Discuss your findings. Did you find what you expected to find? If not, why not? What inferences or general conclusions can you draw from your analysis?</a:t>
+              <a:t>Discuss any problems that arose after exploring the data, and how you resolved them</a:t>
             </a:r>
           </a:p>
         </p:txBody>
       </p:sp>
-      <p:sp>
-        <p:nvSpPr>
-          <p:cNvPr id="4" name="Content Placeholder 3"/>
-          <p:cNvSpPr>
-            <a:spLocks noGrp="1"/>
-          </p:cNvSpPr>
-          <p:nvPr>
-            <p:ph sz="half" idx="2"/>
-          </p:nvPr>
-        </p:nvSpPr>
-        <p:spPr/>
-        <p:txBody>
-          <a:bodyPr/>
-          <a:lstStyle/>
-          <a:p>
-            <a:pPr marL="0" indent="0">
-              <a:buNone/>
-            </a:pPr>
-            <a:endParaRPr lang="en-US" dirty="0"/>
-          </a:p>
-        </p:txBody>
-      </p:sp>
+      <p:pic>
+        <p:nvPicPr>
+          <p:cNvPr id="4" name="Picture 3"/>
+          <p:cNvPicPr>
+            <a:picLocks noChangeAspect="1"/>
+          </p:cNvPicPr>
+          <p:nvPr/>
+        </p:nvPicPr>
+        <p:blipFill>
+          <a:blip r:embed="rId3"/>
+          <a:stretch>
+            <a:fillRect/>
+          </a:stretch>
+        </p:blipFill>
+        <p:spPr>
+          <a:xfrm>
+            <a:off x="941312" y="2319329"/>
+            <a:ext cx="7375104" cy="3217976"/>
+          </a:xfrm>
+          <a:prstGeom prst="rect">
+            <a:avLst/>
+          </a:prstGeom>
+        </p:spPr>
+      </p:pic>
     </p:spTree>
     <p:extLst>
       <p:ext uri="{BB962C8B-B14F-4D97-AF65-F5344CB8AC3E}">
-        <p14:creationId xmlns:p14="http://schemas.microsoft.com/office/powerpoint/2010/main" val="2238332124"/>
+        <p14:creationId xmlns:p14="http://schemas.microsoft.com/office/powerpoint/2010/main" val="1167094223"/>
       </p:ext>
     </p:extLst>
   </p:cSld>
@@ -4412,54 +6178,206 @@
           <a:lstStyle/>
           <a:p>
             <a:r>
-              <a:rPr lang="en-US" dirty="0"/>
-              <a:t>Data Analysis and Discussion</a:t>
-            </a:r>
+              <a:rPr lang="en-US" dirty="0" smtClean="0"/>
+              <a:t>Data Cleanup and Exploration</a:t>
+            </a:r>
+            <a:endParaRPr lang="en-US" dirty="0"/>
           </a:p>
         </p:txBody>
       </p:sp>
       <p:sp>
         <p:nvSpPr>
-          <p:cNvPr id="3" name="Content Placeholder 2"/>
-          <p:cNvSpPr>
-            <a:spLocks noGrp="1"/>
-          </p:cNvSpPr>
-          <p:nvPr>
-            <p:ph sz="half" idx="1"/>
-          </p:nvPr>
-        </p:nvSpPr>
-        <p:spPr/>
+          <p:cNvPr id="3" name="Rectangle 3"/>
+          <p:cNvSpPr txBox="1">
+            <a:spLocks noChangeArrowheads="1"/>
+          </p:cNvSpPr>
+          <p:nvPr/>
+        </p:nvSpPr>
+        <p:spPr>
+          <a:xfrm>
+            <a:off x="899592" y="1412776"/>
+            <a:ext cx="7704855" cy="5112568"/>
+          </a:xfrm>
+          <a:prstGeom prst="rect">
+            <a:avLst/>
+          </a:prstGeom>
+        </p:spPr>
+        <p:style>
+          <a:lnRef idx="2">
+            <a:schemeClr val="accent3"/>
+          </a:lnRef>
+          <a:fillRef idx="1">
+            <a:schemeClr val="lt1"/>
+          </a:fillRef>
+          <a:effectRef idx="0">
+            <a:schemeClr val="accent3"/>
+          </a:effectRef>
+          <a:fontRef idx="minor">
+            <a:schemeClr val="dk1"/>
+          </a:fontRef>
+        </p:style>
         <p:txBody>
           <a:bodyPr/>
-          <a:lstStyle/>
-          <a:p>
-            <a:r>
-              <a:rPr lang="en-US" sz="1400" b="1" dirty="0"/>
-              <a:t>How has the age of childbearing changed over time</a:t>
-            </a:r>
-            <a:r>
-              <a:rPr lang="en-US" sz="1400" b="1" dirty="0" smtClean="0"/>
-              <a:t>?</a:t>
-            </a:r>
-            <a:endParaRPr lang="en-US" sz="1400" b="1" dirty="0" smtClean="0"/>
-          </a:p>
-          <a:p>
-            <a:endParaRPr lang="en-US" sz="1400" dirty="0" smtClean="0"/>
-          </a:p>
-          <a:p>
+          <a:lstStyle>
+            <a:lvl1pPr marL="342900" indent="-342900" algn="l" rtl="0" fontAlgn="base">
+              <a:spcBef>
+                <a:spcPct val="20000"/>
+              </a:spcBef>
+              <a:spcAft>
+                <a:spcPct val="0"/>
+              </a:spcAft>
+              <a:buChar char="•"/>
+              <a:defRPr sz="2800">
+                <a:solidFill>
+                  <a:schemeClr val="tx2"/>
+                </a:solidFill>
+                <a:latin typeface="+mn-lt"/>
+                <a:ea typeface="+mn-ea"/>
+                <a:cs typeface="+mn-cs"/>
+              </a:defRPr>
+            </a:lvl1pPr>
+            <a:lvl2pPr marL="742950" indent="-285750" algn="l" rtl="0" fontAlgn="base">
+              <a:spcBef>
+                <a:spcPct val="20000"/>
+              </a:spcBef>
+              <a:spcAft>
+                <a:spcPct val="0"/>
+              </a:spcAft>
+              <a:buChar char="–"/>
+              <a:defRPr sz="2400" b="1">
+                <a:solidFill>
+                  <a:schemeClr val="tx2"/>
+                </a:solidFill>
+                <a:latin typeface="+mn-lt"/>
+              </a:defRPr>
+            </a:lvl2pPr>
+            <a:lvl3pPr marL="1143000" indent="-228600" algn="l" rtl="0" fontAlgn="base">
+              <a:spcBef>
+                <a:spcPct val="20000"/>
+              </a:spcBef>
+              <a:spcAft>
+                <a:spcPct val="0"/>
+              </a:spcAft>
+              <a:buChar char="•"/>
+              <a:defRPr sz="2400">
+                <a:solidFill>
+                  <a:schemeClr val="tx2"/>
+                </a:solidFill>
+                <a:latin typeface="+mn-lt"/>
+              </a:defRPr>
+            </a:lvl3pPr>
+            <a:lvl4pPr marL="1600200" indent="-228600" algn="l" rtl="0" fontAlgn="base">
+              <a:spcBef>
+                <a:spcPct val="20000"/>
+              </a:spcBef>
+              <a:spcAft>
+                <a:spcPct val="0"/>
+              </a:spcAft>
+              <a:buChar char="–"/>
+              <a:defRPr sz="2000">
+                <a:solidFill>
+                  <a:schemeClr val="tx2"/>
+                </a:solidFill>
+                <a:latin typeface="+mn-lt"/>
+              </a:defRPr>
+            </a:lvl4pPr>
+            <a:lvl5pPr marL="2057400" indent="-228600" algn="l" rtl="0" fontAlgn="base">
+              <a:spcBef>
+                <a:spcPct val="20000"/>
+              </a:spcBef>
+              <a:spcAft>
+                <a:spcPct val="0"/>
+              </a:spcAft>
+              <a:buChar char="»"/>
+              <a:defRPr sz="2000">
+                <a:solidFill>
+                  <a:schemeClr val="tx2"/>
+                </a:solidFill>
+                <a:latin typeface="+mn-lt"/>
+              </a:defRPr>
+            </a:lvl5pPr>
+            <a:lvl6pPr marL="2514600" indent="-228600" algn="l" rtl="0" fontAlgn="base">
+              <a:spcBef>
+                <a:spcPct val="20000"/>
+              </a:spcBef>
+              <a:spcAft>
+                <a:spcPct val="0"/>
+              </a:spcAft>
+              <a:buChar char="»"/>
+              <a:defRPr sz="2000">
+                <a:solidFill>
+                  <a:schemeClr val="tx2"/>
+                </a:solidFill>
+                <a:latin typeface="+mn-lt"/>
+              </a:defRPr>
+            </a:lvl6pPr>
+            <a:lvl7pPr marL="2971800" indent="-228600" algn="l" rtl="0" fontAlgn="base">
+              <a:spcBef>
+                <a:spcPct val="20000"/>
+              </a:spcBef>
+              <a:spcAft>
+                <a:spcPct val="0"/>
+              </a:spcAft>
+              <a:buChar char="»"/>
+              <a:defRPr sz="2000">
+                <a:solidFill>
+                  <a:schemeClr val="tx2"/>
+                </a:solidFill>
+                <a:latin typeface="+mn-lt"/>
+              </a:defRPr>
+            </a:lvl7pPr>
+            <a:lvl8pPr marL="3429000" indent="-228600" algn="l" rtl="0" fontAlgn="base">
+              <a:spcBef>
+                <a:spcPct val="20000"/>
+              </a:spcBef>
+              <a:spcAft>
+                <a:spcPct val="0"/>
+              </a:spcAft>
+              <a:buChar char="»"/>
+              <a:defRPr sz="2000">
+                <a:solidFill>
+                  <a:schemeClr val="tx2"/>
+                </a:solidFill>
+                <a:latin typeface="+mn-lt"/>
+              </a:defRPr>
+            </a:lvl8pPr>
+            <a:lvl9pPr marL="3886200" indent="-228600" algn="l" rtl="0" fontAlgn="base">
+              <a:spcBef>
+                <a:spcPct val="20000"/>
+              </a:spcBef>
+              <a:spcAft>
+                <a:spcPct val="0"/>
+              </a:spcAft>
+              <a:buChar char="»"/>
+              <a:defRPr sz="2000">
+                <a:solidFill>
+                  <a:schemeClr val="tx2"/>
+                </a:solidFill>
+                <a:latin typeface="+mn-lt"/>
+              </a:defRPr>
+            </a:lvl9pPr>
+          </a:lstStyle>
+          <a:p>
+            <a:pPr>
+              <a:lnSpc>
+                <a:spcPct val="80000"/>
+              </a:lnSpc>
+            </a:pPr>
+            <a:endParaRPr lang="en-US" sz="1400" dirty="0"/>
+          </a:p>
+          <a:p>
+            <a:pPr>
+              <a:lnSpc>
+                <a:spcPct val="80000"/>
+              </a:lnSpc>
+            </a:pPr>
             <a:r>
               <a:rPr lang="en-US" sz="1400" dirty="0" smtClean="0"/>
-              <a:t>Discuss </a:t>
+              <a:t>Present </a:t>
             </a:r>
             <a:r>
               <a:rPr lang="en-US" sz="1400" dirty="0"/>
-              <a:t>the steps you took to analyze the data and answer each question you asked in your proposal </a:t>
-            </a:r>
-          </a:p>
-          <a:p>
-            <a:r>
-              <a:rPr lang="en-US" sz="1400" dirty="0"/>
-              <a:t>Present and discuss interesting figures developed during analysis with the help of </a:t>
+              <a:t>and discuss interesting figures developed during exploration with the help of </a:t>
             </a:r>
             <a:r>
               <a:rPr lang="en-US" sz="1400" dirty="0" err="1"/>
@@ -4475,39 +6393,85 @@
             </a:r>
           </a:p>
           <a:p>
-            <a:r>
-              <a:rPr lang="en-US" sz="1400" dirty="0"/>
-              <a:t>Discuss your findings. Did you find what you expected to find? If not, why not? What inferences or general conclusions can you draw from your analysis?</a:t>
-            </a:r>
-          </a:p>
-        </p:txBody>
-      </p:sp>
-      <p:sp>
-        <p:nvSpPr>
-          <p:cNvPr id="4" name="Content Placeholder 3"/>
-          <p:cNvSpPr>
-            <a:spLocks noGrp="1"/>
-          </p:cNvSpPr>
-          <p:nvPr>
-            <p:ph sz="half" idx="2"/>
-          </p:nvPr>
-        </p:nvSpPr>
-        <p:spPr/>
-        <p:txBody>
-          <a:bodyPr/>
-          <a:lstStyle/>
-          <a:p>
-            <a:pPr marL="0" indent="0">
-              <a:buNone/>
-            </a:pPr>
-            <a:endParaRPr lang="en-US" dirty="0"/>
+            <a:pPr lvl="1">
+              <a:lnSpc>
+                <a:spcPct val="80000"/>
+              </a:lnSpc>
+            </a:pPr>
+            <a:r>
+              <a:rPr lang="en-US" altLang="ko-KR" sz="1000" kern="0" dirty="0" smtClean="0">
+                <a:latin typeface="Verdana" pitchFamily="34" charset="0"/>
+                <a:ea typeface="굴림" charset="-127"/>
+              </a:rPr>
+              <a:t>Outliers information </a:t>
+            </a:r>
+          </a:p>
+          <a:p>
+            <a:pPr lvl="1">
+              <a:lnSpc>
+                <a:spcPct val="80000"/>
+              </a:lnSpc>
+            </a:pPr>
+            <a:r>
+              <a:rPr lang="en-US" altLang="ko-KR" sz="1000" kern="0" dirty="0" smtClean="0">
+                <a:latin typeface="Verdana" pitchFamily="34" charset="0"/>
+                <a:ea typeface="굴림" charset="-127"/>
+              </a:rPr>
+              <a:t>Country Data points for above and below the population sustainability rate of 2.1</a:t>
+            </a:r>
+          </a:p>
+          <a:p>
+            <a:pPr lvl="1">
+              <a:lnSpc>
+                <a:spcPct val="80000"/>
+              </a:lnSpc>
+            </a:pPr>
+            <a:r>
+              <a:rPr lang="en-US" altLang="ko-KR" sz="1000" kern="0" dirty="0" smtClean="0">
+                <a:latin typeface="Verdana" pitchFamily="34" charset="0"/>
+                <a:ea typeface="굴림" charset="-127"/>
+              </a:rPr>
+              <a:t>Mappings of </a:t>
+            </a:r>
+          </a:p>
+          <a:p>
+            <a:pPr lvl="1">
+              <a:lnSpc>
+                <a:spcPct val="80000"/>
+              </a:lnSpc>
+            </a:pPr>
+            <a:r>
+              <a:rPr lang="en-US" altLang="ko-KR" sz="1000" kern="0" dirty="0" smtClean="0">
+                <a:latin typeface="Verdana" pitchFamily="34" charset="0"/>
+                <a:ea typeface="굴림" charset="-127"/>
+              </a:rPr>
+              <a:t>Scatterplots of </a:t>
+            </a:r>
+          </a:p>
+          <a:p>
+            <a:pPr lvl="1">
+              <a:lnSpc>
+                <a:spcPct val="80000"/>
+              </a:lnSpc>
+            </a:pPr>
+            <a:r>
+              <a:rPr lang="en-US" altLang="ko-KR" sz="1000" kern="0" dirty="0" smtClean="0">
+                <a:latin typeface="Verdana" pitchFamily="34" charset="0"/>
+                <a:ea typeface="굴림" charset="-127"/>
+              </a:rPr>
+              <a:t>Statistics and Graphs of</a:t>
+            </a:r>
+            <a:endParaRPr lang="en-US" altLang="ko-KR" sz="1000" kern="0" dirty="0" smtClean="0">
+              <a:latin typeface="Verdana" pitchFamily="34" charset="0"/>
+              <a:ea typeface="굴림" charset="-127"/>
+            </a:endParaRPr>
           </a:p>
         </p:txBody>
       </p:sp>
     </p:spTree>
     <p:extLst>
       <p:ext uri="{BB962C8B-B14F-4D97-AF65-F5344CB8AC3E}">
-        <p14:creationId xmlns:p14="http://schemas.microsoft.com/office/powerpoint/2010/main" val="275733070"/>
+        <p14:creationId xmlns:p14="http://schemas.microsoft.com/office/powerpoint/2010/main" val="3208467114"/>
       </p:ext>
     </p:extLst>
   </p:cSld>
@@ -4520,18 +6484,6 @@
 <file path=ppt/slides/slide9.xml><?xml version="1.0" encoding="utf-8"?>
 <p:sld xmlns:a="http://schemas.openxmlformats.org/drawingml/2006/main" xmlns:r="http://schemas.openxmlformats.org/officeDocument/2006/relationships" xmlns:p="http://schemas.openxmlformats.org/presentationml/2006/main">
   <p:cSld>
-    <p:bg>
-      <p:bgPr>
-        <a:blipFill dpi="0" rotWithShape="0">
-          <a:blip r:embed="rId2"/>
-          <a:srcRect/>
-          <a:stretch>
-            <a:fillRect/>
-          </a:stretch>
-        </a:blipFill>
-        <a:effectLst/>
-      </p:bgPr>
-    </p:bg>
     <p:spTree>
       <p:nvGrpSpPr>
         <p:cNvPr id="1" name=""/>
@@ -4548,90 +6500,502 @@
       </p:grpSpPr>
       <p:sp>
         <p:nvSpPr>
-          <p:cNvPr id="114690" name="Rectangle 2"/>
+          <p:cNvPr id="2" name="Title 1"/>
           <p:cNvSpPr>
-            <a:spLocks noGrp="1" noChangeArrowheads="1"/>
+            <a:spLocks noGrp="1"/>
           </p:cNvSpPr>
           <p:nvPr>
             <p:ph type="title"/>
           </p:nvPr>
         </p:nvSpPr>
-        <p:spPr>
-          <a:xfrm>
-            <a:off x="1908175" y="188913"/>
-            <a:ext cx="6911975" cy="723900"/>
-          </a:xfrm>
-        </p:spPr>
+        <p:spPr/>
         <p:txBody>
           <a:bodyPr/>
           <a:lstStyle/>
           <a:p>
             <a:r>
-              <a:rPr lang="en-US" dirty="0" smtClean="0">
-                <a:solidFill>
-                  <a:schemeClr val="tx1"/>
-                </a:solidFill>
-              </a:rPr>
-              <a:t>Post Mortem</a:t>
-            </a:r>
-            <a:endParaRPr lang="en-US" dirty="0">
-              <a:solidFill>
-                <a:schemeClr val="tx1"/>
-              </a:solidFill>
-            </a:endParaRPr>
+              <a:rPr lang="en-US" dirty="0" smtClean="0"/>
+              <a:t>Data Cleanup and Exploration</a:t>
+            </a:r>
+            <a:endParaRPr lang="en-US" dirty="0"/>
           </a:p>
         </p:txBody>
       </p:sp>
       <p:sp>
         <p:nvSpPr>
-          <p:cNvPr id="114691" name="Rectangle 3"/>
-          <p:cNvSpPr>
-            <a:spLocks noGrp="1" noChangeArrowheads="1"/>
-          </p:cNvSpPr>
-          <p:nvPr>
-            <p:ph type="body" idx="1"/>
-          </p:nvPr>
+          <p:cNvPr id="3" name="Rectangle 3"/>
+          <p:cNvSpPr txBox="1">
+            <a:spLocks noChangeArrowheads="1"/>
+          </p:cNvSpPr>
+          <p:nvPr/>
         </p:nvSpPr>
         <p:spPr>
           <a:xfrm>
-            <a:off x="1908175" y="1052513"/>
-            <a:ext cx="6911975" cy="5473700"/>
+            <a:off x="899592" y="1412776"/>
+            <a:ext cx="7704855" cy="5112568"/>
           </a:xfrm>
+          <a:prstGeom prst="rect">
+            <a:avLst/>
+          </a:prstGeom>
         </p:spPr>
+        <p:style>
+          <a:lnRef idx="2">
+            <a:schemeClr val="accent3"/>
+          </a:lnRef>
+          <a:fillRef idx="1">
+            <a:schemeClr val="lt1"/>
+          </a:fillRef>
+          <a:effectRef idx="0">
+            <a:schemeClr val="accent3"/>
+          </a:effectRef>
+          <a:fontRef idx="minor">
+            <a:schemeClr val="dk1"/>
+          </a:fontRef>
+        </p:style>
         <p:txBody>
           <a:bodyPr/>
-          <a:lstStyle/>
-          <a:p>
+          <a:lstStyle>
+            <a:lvl1pPr marL="342900" indent="-342900" algn="l" rtl="0" fontAlgn="base">
+              <a:spcBef>
+                <a:spcPct val="20000"/>
+              </a:spcBef>
+              <a:spcAft>
+                <a:spcPct val="0"/>
+              </a:spcAft>
+              <a:buChar char="•"/>
+              <a:defRPr sz="2800">
+                <a:solidFill>
+                  <a:schemeClr val="tx2"/>
+                </a:solidFill>
+                <a:latin typeface="+mn-lt"/>
+                <a:ea typeface="+mn-ea"/>
+                <a:cs typeface="+mn-cs"/>
+              </a:defRPr>
+            </a:lvl1pPr>
+            <a:lvl2pPr marL="742950" indent="-285750" algn="l" rtl="0" fontAlgn="base">
+              <a:spcBef>
+                <a:spcPct val="20000"/>
+              </a:spcBef>
+              <a:spcAft>
+                <a:spcPct val="0"/>
+              </a:spcAft>
+              <a:buChar char="–"/>
+              <a:defRPr sz="2400" b="1">
+                <a:solidFill>
+                  <a:schemeClr val="tx2"/>
+                </a:solidFill>
+                <a:latin typeface="+mn-lt"/>
+              </a:defRPr>
+            </a:lvl2pPr>
+            <a:lvl3pPr marL="1143000" indent="-228600" algn="l" rtl="0" fontAlgn="base">
+              <a:spcBef>
+                <a:spcPct val="20000"/>
+              </a:spcBef>
+              <a:spcAft>
+                <a:spcPct val="0"/>
+              </a:spcAft>
+              <a:buChar char="•"/>
+              <a:defRPr sz="2400">
+                <a:solidFill>
+                  <a:schemeClr val="tx2"/>
+                </a:solidFill>
+                <a:latin typeface="+mn-lt"/>
+              </a:defRPr>
+            </a:lvl3pPr>
+            <a:lvl4pPr marL="1600200" indent="-228600" algn="l" rtl="0" fontAlgn="base">
+              <a:spcBef>
+                <a:spcPct val="20000"/>
+              </a:spcBef>
+              <a:spcAft>
+                <a:spcPct val="0"/>
+              </a:spcAft>
+              <a:buChar char="–"/>
+              <a:defRPr sz="2000">
+                <a:solidFill>
+                  <a:schemeClr val="tx2"/>
+                </a:solidFill>
+                <a:latin typeface="+mn-lt"/>
+              </a:defRPr>
+            </a:lvl4pPr>
+            <a:lvl5pPr marL="2057400" indent="-228600" algn="l" rtl="0" fontAlgn="base">
+              <a:spcBef>
+                <a:spcPct val="20000"/>
+              </a:spcBef>
+              <a:spcAft>
+                <a:spcPct val="0"/>
+              </a:spcAft>
+              <a:buChar char="»"/>
+              <a:defRPr sz="2000">
+                <a:solidFill>
+                  <a:schemeClr val="tx2"/>
+                </a:solidFill>
+                <a:latin typeface="+mn-lt"/>
+              </a:defRPr>
+            </a:lvl5pPr>
+            <a:lvl6pPr marL="2514600" indent="-228600" algn="l" rtl="0" fontAlgn="base">
+              <a:spcBef>
+                <a:spcPct val="20000"/>
+              </a:spcBef>
+              <a:spcAft>
+                <a:spcPct val="0"/>
+              </a:spcAft>
+              <a:buChar char="»"/>
+              <a:defRPr sz="2000">
+                <a:solidFill>
+                  <a:schemeClr val="tx2"/>
+                </a:solidFill>
+                <a:latin typeface="+mn-lt"/>
+              </a:defRPr>
+            </a:lvl6pPr>
+            <a:lvl7pPr marL="2971800" indent="-228600" algn="l" rtl="0" fontAlgn="base">
+              <a:spcBef>
+                <a:spcPct val="20000"/>
+              </a:spcBef>
+              <a:spcAft>
+                <a:spcPct val="0"/>
+              </a:spcAft>
+              <a:buChar char="»"/>
+              <a:defRPr sz="2000">
+                <a:solidFill>
+                  <a:schemeClr val="tx2"/>
+                </a:solidFill>
+                <a:latin typeface="+mn-lt"/>
+              </a:defRPr>
+            </a:lvl7pPr>
+            <a:lvl8pPr marL="3429000" indent="-228600" algn="l" rtl="0" fontAlgn="base">
+              <a:spcBef>
+                <a:spcPct val="20000"/>
+              </a:spcBef>
+              <a:spcAft>
+                <a:spcPct val="0"/>
+              </a:spcAft>
+              <a:buChar char="»"/>
+              <a:defRPr sz="2000">
+                <a:solidFill>
+                  <a:schemeClr val="tx2"/>
+                </a:solidFill>
+                <a:latin typeface="+mn-lt"/>
+              </a:defRPr>
+            </a:lvl8pPr>
+            <a:lvl9pPr marL="3886200" indent="-228600" algn="l" rtl="0" fontAlgn="base">
+              <a:spcBef>
+                <a:spcPct val="20000"/>
+              </a:spcBef>
+              <a:spcAft>
+                <a:spcPct val="0"/>
+              </a:spcAft>
+              <a:buChar char="»"/>
+              <a:defRPr sz="2000">
+                <a:solidFill>
+                  <a:schemeClr val="tx2"/>
+                </a:solidFill>
+                <a:latin typeface="+mn-lt"/>
+              </a:defRPr>
+            </a:lvl9pPr>
+          </a:lstStyle>
+          <a:p>
+            <a:pPr>
+              <a:lnSpc>
+                <a:spcPct val="80000"/>
+              </a:lnSpc>
+            </a:pPr>
             <a:r>
               <a:rPr lang="en-US" sz="1400" dirty="0"/>
-              <a:t>Discuss any difficulties that arose, and how you dealt with them </a:t>
-            </a:r>
+              <a:t>Describe the exploration and cleanup </a:t>
+            </a:r>
+            <a:r>
+              <a:rPr lang="en-US" sz="1400" dirty="0" smtClean="0"/>
+              <a:t>process</a:t>
+            </a:r>
+          </a:p>
+          <a:p>
+            <a:pPr lvl="1">
+              <a:lnSpc>
+                <a:spcPct val="80000"/>
+              </a:lnSpc>
+            </a:pPr>
+            <a:r>
+              <a:rPr lang="en-US" sz="1000" dirty="0" smtClean="0"/>
+              <a:t>Age-specific fertility rates, Total fertility and .csv – this was our first data file that we started exploring. </a:t>
+            </a:r>
+          </a:p>
+          <a:p>
+            <a:pPr lvl="2">
+              <a:lnSpc>
+                <a:spcPct val="80000"/>
+              </a:lnSpc>
+            </a:pPr>
+            <a:r>
+              <a:rPr lang="en-US" sz="1000" dirty="0" smtClean="0"/>
+              <a:t>Headers had to be removed and the grouping by age columns had to be put in place</a:t>
+            </a:r>
+          </a:p>
+          <a:p>
+            <a:pPr lvl="2">
+              <a:lnSpc>
+                <a:spcPct val="80000"/>
+              </a:lnSpc>
+            </a:pPr>
+            <a:r>
+              <a:rPr lang="en-US" sz="1000" dirty="0" smtClean="0"/>
+              <a:t>Final Data frame was created – </a:t>
+            </a:r>
+            <a:r>
+              <a:rPr lang="en-US" sz="1000" dirty="0" err="1" smtClean="0"/>
+              <a:t>fertility_clean</a:t>
+            </a:r>
+            <a:endParaRPr lang="en-US" sz="1000" dirty="0" smtClean="0"/>
+          </a:p>
+          <a:p>
+            <a:pPr lvl="2">
+              <a:lnSpc>
+                <a:spcPct val="80000"/>
+              </a:lnSpc>
+            </a:pPr>
+            <a:r>
+              <a:rPr lang="en-US" sz="1000" dirty="0" smtClean="0"/>
+              <a:t>For sharing this main file was written to a csv file </a:t>
+            </a:r>
+            <a:r>
+              <a:rPr lang="en-US" sz="1000" b="1" dirty="0" smtClean="0"/>
+              <a:t>(add file name)</a:t>
+            </a:r>
+          </a:p>
+          <a:p>
+            <a:pPr lvl="2">
+              <a:lnSpc>
+                <a:spcPct val="80000"/>
+              </a:lnSpc>
+            </a:pPr>
+            <a:r>
+              <a:rPr lang="en-US" sz="1000" dirty="0" smtClean="0"/>
+              <a:t>Sorting and retrieving only the most recent year was done – (</a:t>
+            </a:r>
+            <a:r>
+              <a:rPr lang="en-US" sz="1000" dirty="0" err="1" smtClean="0"/>
+              <a:t>DataFrame</a:t>
+            </a:r>
+            <a:r>
+              <a:rPr lang="en-US" sz="1000" dirty="0" smtClean="0"/>
+              <a:t>: </a:t>
+            </a:r>
+            <a:r>
+              <a:rPr lang="en-US" sz="1000" dirty="0" err="1" smtClean="0"/>
+              <a:t>last_year</a:t>
+            </a:r>
+            <a:endParaRPr lang="en-US" sz="1000" dirty="0" smtClean="0"/>
+          </a:p>
+          <a:p>
+            <a:pPr lvl="2">
+              <a:lnSpc>
+                <a:spcPct val="80000"/>
+              </a:lnSpc>
+            </a:pPr>
+            <a:endParaRPr lang="en-US" sz="1000" dirty="0" smtClean="0"/>
+          </a:p>
+          <a:p>
+            <a:pPr lvl="1">
+              <a:lnSpc>
+                <a:spcPct val="80000"/>
+              </a:lnSpc>
+            </a:pPr>
+            <a:r>
+              <a:rPr lang="en-US" sz="1000" dirty="0" err="1" smtClean="0"/>
+              <a:t>csv_files</a:t>
+            </a:r>
+            <a:r>
+              <a:rPr lang="en-US" sz="1000" dirty="0" smtClean="0"/>
+              <a:t>/literacy-rate-adults.csv – this was our literacy rates that was merged </a:t>
+            </a:r>
+          </a:p>
+          <a:p>
+            <a:pPr lvl="1">
+              <a:lnSpc>
+                <a:spcPct val="80000"/>
+              </a:lnSpc>
+            </a:pPr>
+            <a:endParaRPr lang="en-US" sz="1000" dirty="0"/>
+          </a:p>
+          <a:p>
+            <a:pPr>
+              <a:lnSpc>
+                <a:spcPct val="80000"/>
+              </a:lnSpc>
+            </a:pPr>
             <a:endParaRPr lang="en-US" sz="1400" dirty="0" smtClean="0"/>
           </a:p>
           <a:p>
+            <a:pPr lvl="1">
+              <a:lnSpc>
+                <a:spcPct val="80000"/>
+              </a:lnSpc>
+            </a:pPr>
+            <a:r>
+              <a:rPr lang="en-US" sz="1000" dirty="0" smtClean="0"/>
+              <a:t>We </a:t>
+            </a:r>
+            <a:r>
+              <a:rPr lang="en-US" sz="1000" dirty="0" smtClean="0"/>
+              <a:t>did not anticipate a mismatch between countries and data. There was a lot of variability between the number of years and what years were listed for each country</a:t>
+            </a:r>
+            <a:endParaRPr lang="en-US" sz="1000" dirty="0"/>
+          </a:p>
+          <a:p>
+            <a:pPr>
+              <a:lnSpc>
+                <a:spcPct val="80000"/>
+              </a:lnSpc>
+            </a:pPr>
+            <a:endParaRPr lang="en-US" sz="1400" dirty="0"/>
+          </a:p>
+          <a:p>
+            <a:pPr>
+              <a:lnSpc>
+                <a:spcPct val="80000"/>
+              </a:lnSpc>
+            </a:pPr>
+            <a:r>
+              <a:rPr lang="en-US" sz="1400" dirty="0"/>
+              <a:t>Discuss any problems that arose after exploring the data, and how you resolved </a:t>
+            </a:r>
             <a:r>
               <a:rPr lang="en-US" sz="1400" dirty="0" smtClean="0"/>
-              <a:t>Discuss </a:t>
-            </a:r>
+              <a:t>them</a:t>
+            </a:r>
+          </a:p>
+          <a:p>
+            <a:pPr lvl="1">
+              <a:lnSpc>
+                <a:spcPct val="80000"/>
+              </a:lnSpc>
+            </a:pPr>
+            <a:r>
+              <a:rPr lang="en-US" sz="1000" dirty="0" smtClean="0"/>
+              <a:t>Our first literacy rates data did not produce enough matching years to our fertility data, we found another source</a:t>
+            </a:r>
+          </a:p>
+          <a:p>
+            <a:pPr lvl="1">
+              <a:lnSpc>
+                <a:spcPct val="80000"/>
+              </a:lnSpc>
+            </a:pPr>
+            <a:r>
+              <a:rPr lang="en-US" sz="1000" dirty="0" smtClean="0"/>
+              <a:t>We found that we need some additional data to bring information together in small groups than country, so we added continent into the data</a:t>
+            </a:r>
+          </a:p>
+          <a:p>
+            <a:pPr lvl="1">
+              <a:lnSpc>
+                <a:spcPct val="80000"/>
+              </a:lnSpc>
+            </a:pPr>
+            <a:endParaRPr lang="en-US" sz="1000" dirty="0"/>
+          </a:p>
+          <a:p>
+            <a:pPr>
+              <a:lnSpc>
+                <a:spcPct val="80000"/>
+              </a:lnSpc>
+            </a:pPr>
+            <a:endParaRPr lang="en-US" sz="1400" dirty="0"/>
+          </a:p>
+          <a:p>
+            <a:pPr>
+              <a:lnSpc>
+                <a:spcPct val="80000"/>
+              </a:lnSpc>
+            </a:pPr>
             <a:r>
               <a:rPr lang="en-US" sz="1400" dirty="0"/>
-              <a:t>any additional questions that came up, but which you didn't have time to answer: </a:t>
-            </a:r>
-            <a:endParaRPr lang="en-US" sz="1400" dirty="0" smtClean="0"/>
-          </a:p>
-          <a:p>
+              <a:t>Present and discuss interesting figures developed during exploration with the help of </a:t>
+            </a:r>
+            <a:r>
+              <a:rPr lang="en-US" sz="1400" dirty="0" err="1"/>
+              <a:t>Jupyter</a:t>
+            </a:r>
+            <a:r>
+              <a:rPr lang="en-US" sz="1400" dirty="0"/>
+              <a:t> </a:t>
+            </a:r>
             <a:r>
               <a:rPr lang="en-US" sz="1400" dirty="0" smtClean="0"/>
-              <a:t>What </a:t>
-            </a:r>
-            <a:r>
-              <a:rPr lang="en-US" sz="1400" dirty="0"/>
-              <a:t>would you research next, if you had two more weeks?</a:t>
-            </a:r>
-            <a:endParaRPr lang="en-US" sz="1400" dirty="0">
-              <a:solidFill>
-                <a:schemeClr val="tx1"/>
-              </a:solidFill>
+              <a:t>Notebook</a:t>
+            </a:r>
+          </a:p>
+          <a:p>
+            <a:pPr lvl="1">
+              <a:lnSpc>
+                <a:spcPct val="80000"/>
+              </a:lnSpc>
+            </a:pPr>
+            <a:r>
+              <a:rPr lang="en-US" altLang="ko-KR" sz="1000" kern="0" dirty="0" smtClean="0">
+                <a:latin typeface="Verdana" pitchFamily="34" charset="0"/>
+                <a:ea typeface="굴림" charset="-127"/>
+              </a:rPr>
+              <a:t>Outliers information </a:t>
+            </a:r>
+          </a:p>
+          <a:p>
+            <a:pPr lvl="1">
+              <a:lnSpc>
+                <a:spcPct val="80000"/>
+              </a:lnSpc>
+            </a:pPr>
+            <a:r>
+              <a:rPr lang="en-US" altLang="ko-KR" sz="1000" kern="0" dirty="0" smtClean="0">
+                <a:latin typeface="Verdana" pitchFamily="34" charset="0"/>
+                <a:ea typeface="굴림" charset="-127"/>
+              </a:rPr>
+              <a:t>Country Data points for above and below the population sustainability rate of 2.1</a:t>
+            </a:r>
+          </a:p>
+          <a:p>
+            <a:pPr lvl="1">
+              <a:lnSpc>
+                <a:spcPct val="80000"/>
+              </a:lnSpc>
+            </a:pPr>
+            <a:r>
+              <a:rPr lang="en-US" altLang="ko-KR" sz="1000" kern="0" dirty="0" smtClean="0">
+                <a:latin typeface="Verdana" pitchFamily="34" charset="0"/>
+                <a:ea typeface="굴림" charset="-127"/>
+              </a:rPr>
+              <a:t>Mappings of </a:t>
+            </a:r>
+          </a:p>
+          <a:p>
+            <a:pPr lvl="1">
+              <a:lnSpc>
+                <a:spcPct val="80000"/>
+              </a:lnSpc>
+            </a:pPr>
+            <a:r>
+              <a:rPr lang="en-US" altLang="ko-KR" sz="1000" kern="0" dirty="0" smtClean="0">
+                <a:latin typeface="Verdana" pitchFamily="34" charset="0"/>
+                <a:ea typeface="굴림" charset="-127"/>
+              </a:rPr>
+              <a:t>Scatterplots of </a:t>
+            </a:r>
+          </a:p>
+          <a:p>
+            <a:pPr lvl="1">
+              <a:lnSpc>
+                <a:spcPct val="80000"/>
+              </a:lnSpc>
+            </a:pPr>
+            <a:r>
+              <a:rPr lang="en-US" altLang="ko-KR" sz="1000" kern="0" dirty="0" smtClean="0">
+                <a:latin typeface="Verdana" pitchFamily="34" charset="0"/>
+                <a:ea typeface="굴림" charset="-127"/>
+              </a:rPr>
+              <a:t>Statistics and Graphs of</a:t>
+            </a:r>
+            <a:endParaRPr lang="en-US" altLang="ko-KR" sz="1000" kern="0" dirty="0" smtClean="0">
+              <a:latin typeface="Verdana" pitchFamily="34" charset="0"/>
+              <a:ea typeface="굴림" charset="-127"/>
             </a:endParaRPr>
           </a:p>
         </p:txBody>
@@ -4639,7 +7003,7 @@
     </p:spTree>
     <p:extLst>
       <p:ext uri="{BB962C8B-B14F-4D97-AF65-F5344CB8AC3E}">
-        <p14:creationId xmlns:p14="http://schemas.microsoft.com/office/powerpoint/2010/main" val="4282824275"/>
+        <p14:creationId xmlns:p14="http://schemas.microsoft.com/office/powerpoint/2010/main" val="2982362000"/>
       </p:ext>
     </p:extLst>
   </p:cSld>

</xml_diff>